<commit_message>
015 - ARQUITETURA DE NEGOCIO PARA CADA CENÁRIO
</commit_message>
<xml_diff>
--- a/015 - ARQUITETURA DE NEGOCIO PARA CADA CENÁRIO.pptx
+++ b/015 - ARQUITETURA DE NEGOCIO PARA CADA CENÁRIO.pptx
@@ -5,7 +5,7 @@
     <p:sldMasterId id="2147483648" r:id="rId1"/>
   </p:sldMasterIdLst>
   <p:notesMasterIdLst>
-    <p:notesMasterId r:id="rId11"/>
+    <p:notesMasterId r:id="rId7"/>
   </p:notesMasterIdLst>
   <p:sldIdLst>
     <p:sldId id="419" r:id="rId2"/>
@@ -13,10 +13,6 @@
     <p:sldId id="421" r:id="rId4"/>
     <p:sldId id="422" r:id="rId5"/>
     <p:sldId id="423" r:id="rId6"/>
-    <p:sldId id="424" r:id="rId7"/>
-    <p:sldId id="425" r:id="rId8"/>
-    <p:sldId id="426" r:id="rId9"/>
-    <p:sldId id="427" r:id="rId10"/>
   </p:sldIdLst>
   <p:sldSz cx="12192000" cy="6858000"/>
   <p:notesSz cx="6858000" cy="9144000"/>
@@ -205,7 +201,7 @@
           <a:p>
             <a:fld id="{258E502B-CFFF-4977-BA55-B253021E2457}" type="datetimeFigureOut">
               <a:rPr lang="pt-BR" smtClean="0"/>
-              <a:t>04/09/2020</a:t>
+              <a:t>25/09/2020</a:t>
             </a:fld>
             <a:endParaRPr lang="pt-BR"/>
           </a:p>
@@ -619,7 +615,7 @@
           <a:p>
             <a:fld id="{362C238F-AFC2-456F-A70E-2BEB777654C4}" type="datetimeFigureOut">
               <a:rPr lang="pt-BR" smtClean="0"/>
-              <a:t>04/09/2020</a:t>
+              <a:t>25/09/2020</a:t>
             </a:fld>
             <a:endParaRPr lang="pt-BR"/>
           </a:p>
@@ -817,7 +813,7 @@
           <a:p>
             <a:fld id="{362C238F-AFC2-456F-A70E-2BEB777654C4}" type="datetimeFigureOut">
               <a:rPr lang="pt-BR" smtClean="0"/>
-              <a:t>04/09/2020</a:t>
+              <a:t>25/09/2020</a:t>
             </a:fld>
             <a:endParaRPr lang="pt-BR"/>
           </a:p>
@@ -1025,7 +1021,7 @@
           <a:p>
             <a:fld id="{362C238F-AFC2-456F-A70E-2BEB777654C4}" type="datetimeFigureOut">
               <a:rPr lang="pt-BR" smtClean="0"/>
-              <a:t>04/09/2020</a:t>
+              <a:t>25/09/2020</a:t>
             </a:fld>
             <a:endParaRPr lang="pt-BR"/>
           </a:p>
@@ -1223,7 +1219,7 @@
           <a:p>
             <a:fld id="{362C238F-AFC2-456F-A70E-2BEB777654C4}" type="datetimeFigureOut">
               <a:rPr lang="pt-BR" smtClean="0"/>
-              <a:t>04/09/2020</a:t>
+              <a:t>25/09/2020</a:t>
             </a:fld>
             <a:endParaRPr lang="pt-BR"/>
           </a:p>
@@ -1498,7 +1494,7 @@
           <a:p>
             <a:fld id="{362C238F-AFC2-456F-A70E-2BEB777654C4}" type="datetimeFigureOut">
               <a:rPr lang="pt-BR" smtClean="0"/>
-              <a:t>04/09/2020</a:t>
+              <a:t>25/09/2020</a:t>
             </a:fld>
             <a:endParaRPr lang="pt-BR"/>
           </a:p>
@@ -1763,7 +1759,7 @@
           <a:p>
             <a:fld id="{362C238F-AFC2-456F-A70E-2BEB777654C4}" type="datetimeFigureOut">
               <a:rPr lang="pt-BR" smtClean="0"/>
-              <a:t>04/09/2020</a:t>
+              <a:t>25/09/2020</a:t>
             </a:fld>
             <a:endParaRPr lang="pt-BR"/>
           </a:p>
@@ -2175,7 +2171,7 @@
           <a:p>
             <a:fld id="{362C238F-AFC2-456F-A70E-2BEB777654C4}" type="datetimeFigureOut">
               <a:rPr lang="pt-BR" smtClean="0"/>
-              <a:t>04/09/2020</a:t>
+              <a:t>25/09/2020</a:t>
             </a:fld>
             <a:endParaRPr lang="pt-BR"/>
           </a:p>
@@ -2316,7 +2312,7 @@
           <a:p>
             <a:fld id="{362C238F-AFC2-456F-A70E-2BEB777654C4}" type="datetimeFigureOut">
               <a:rPr lang="pt-BR" smtClean="0"/>
-              <a:t>04/09/2020</a:t>
+              <a:t>25/09/2020</a:t>
             </a:fld>
             <a:endParaRPr lang="pt-BR"/>
           </a:p>
@@ -2429,7 +2425,7 @@
           <a:p>
             <a:fld id="{362C238F-AFC2-456F-A70E-2BEB777654C4}" type="datetimeFigureOut">
               <a:rPr lang="pt-BR" smtClean="0"/>
-              <a:t>04/09/2020</a:t>
+              <a:t>25/09/2020</a:t>
             </a:fld>
             <a:endParaRPr lang="pt-BR"/>
           </a:p>
@@ -2740,7 +2736,7 @@
           <a:p>
             <a:fld id="{362C238F-AFC2-456F-A70E-2BEB777654C4}" type="datetimeFigureOut">
               <a:rPr lang="pt-BR" smtClean="0"/>
-              <a:t>04/09/2020</a:t>
+              <a:t>25/09/2020</a:t>
             </a:fld>
             <a:endParaRPr lang="pt-BR"/>
           </a:p>
@@ -3028,7 +3024,7 @@
           <a:p>
             <a:fld id="{362C238F-AFC2-456F-A70E-2BEB777654C4}" type="datetimeFigureOut">
               <a:rPr lang="pt-BR" smtClean="0"/>
-              <a:t>04/09/2020</a:t>
+              <a:t>25/09/2020</a:t>
             </a:fld>
             <a:endParaRPr lang="pt-BR"/>
           </a:p>
@@ -3269,7 +3265,7 @@
           <a:p>
             <a:fld id="{362C238F-AFC2-456F-A70E-2BEB777654C4}" type="datetimeFigureOut">
               <a:rPr lang="pt-BR" smtClean="0"/>
-              <a:t>04/09/2020</a:t>
+              <a:t>25/09/2020</a:t>
             </a:fld>
             <a:endParaRPr lang="pt-BR"/>
           </a:p>
@@ -3988,258 +3984,6 @@
           </a:p>
         </p:txBody>
       </p:sp>
-      <p:sp>
-        <p:nvSpPr>
-          <p:cNvPr id="9" name="Retângulo 8">
-            <a:extLst>
-              <a:ext uri="{FF2B5EF4-FFF2-40B4-BE49-F238E27FC236}">
-                <a16:creationId xmlns:a16="http://schemas.microsoft.com/office/drawing/2014/main" id="{E1E03CAF-76FF-4C28-BA28-5C0FCE8CDC80}"/>
-              </a:ext>
-            </a:extLst>
-          </p:cNvPr>
-          <p:cNvSpPr/>
-          <p:nvPr/>
-        </p:nvSpPr>
-        <p:spPr>
-          <a:xfrm>
-            <a:off x="7806938" y="266481"/>
-            <a:ext cx="1336431" cy="914400"/>
-          </a:xfrm>
-          <a:prstGeom prst="rect">
-            <a:avLst/>
-          </a:prstGeom>
-        </p:spPr>
-        <p:style>
-          <a:lnRef idx="2">
-            <a:schemeClr val="accent1">
-              <a:shade val="50000"/>
-            </a:schemeClr>
-          </a:lnRef>
-          <a:fillRef idx="1">
-            <a:schemeClr val="accent1"/>
-          </a:fillRef>
-          <a:effectRef idx="0">
-            <a:schemeClr val="accent1"/>
-          </a:effectRef>
-          <a:fontRef idx="minor">
-            <a:schemeClr val="lt1"/>
-          </a:fontRef>
-        </p:style>
-        <p:txBody>
-          <a:bodyPr rtlCol="0" anchor="ctr"/>
-          <a:lstStyle/>
-          <a:p>
-            <a:pPr algn="ctr"/>
-            <a:r>
-              <a:rPr lang="pt-BR" dirty="0"/>
-              <a:t>Fornecedor</a:t>
-            </a:r>
-          </a:p>
-        </p:txBody>
-      </p:sp>
-      <p:sp>
-        <p:nvSpPr>
-          <p:cNvPr id="10" name="CaixaDeTexto 9">
-            <a:extLst>
-              <a:ext uri="{FF2B5EF4-FFF2-40B4-BE49-F238E27FC236}">
-                <a16:creationId xmlns:a16="http://schemas.microsoft.com/office/drawing/2014/main" id="{43D2EA2F-C306-413E-AAF6-AD3607B7AEA6}"/>
-              </a:ext>
-            </a:extLst>
-          </p:cNvPr>
-          <p:cNvSpPr txBox="1"/>
-          <p:nvPr/>
-        </p:nvSpPr>
-        <p:spPr>
-          <a:xfrm>
-            <a:off x="8529023" y="1219114"/>
-            <a:ext cx="2470548" cy="1200329"/>
-          </a:xfrm>
-          <a:prstGeom prst="rect">
-            <a:avLst/>
-          </a:prstGeom>
-          <a:noFill/>
-        </p:spPr>
-        <p:txBody>
-          <a:bodyPr wrap="none" rtlCol="0">
-            <a:spAutoFit/>
-          </a:bodyPr>
-          <a:lstStyle/>
-          <a:p>
-            <a:pPr marL="342900" indent="-342900">
-              <a:buFont typeface="+mj-lt"/>
-              <a:buAutoNum type="arabicPeriod"/>
-            </a:pPr>
-            <a:r>
-              <a:rPr lang="pt-BR" dirty="0"/>
-              <a:t>Fornecer Orçamento</a:t>
-            </a:r>
-          </a:p>
-          <a:p>
-            <a:pPr marL="342900" indent="-342900">
-              <a:buFont typeface="+mj-lt"/>
-              <a:buAutoNum type="arabicPeriod"/>
-            </a:pPr>
-            <a:r>
-              <a:rPr lang="pt-BR" dirty="0"/>
-              <a:t>Vender</a:t>
-            </a:r>
-          </a:p>
-          <a:p>
-            <a:pPr marL="342900" indent="-342900">
-              <a:buFont typeface="+mj-lt"/>
-              <a:buAutoNum type="arabicPeriod"/>
-            </a:pPr>
-            <a:r>
-              <a:rPr lang="pt-BR" dirty="0"/>
-              <a:t>Trocar Produto</a:t>
-            </a:r>
-          </a:p>
-          <a:p>
-            <a:pPr marL="342900" indent="-342900">
-              <a:buFont typeface="+mj-lt"/>
-              <a:buAutoNum type="arabicPeriod"/>
-            </a:pPr>
-            <a:r>
-              <a:rPr lang="pt-BR" dirty="0"/>
-              <a:t>Desfazer Venda</a:t>
-            </a:r>
-          </a:p>
-        </p:txBody>
-      </p:sp>
-      <p:cxnSp>
-        <p:nvCxnSpPr>
-          <p:cNvPr id="12" name="Conector: Curvo 11">
-            <a:extLst>
-              <a:ext uri="{FF2B5EF4-FFF2-40B4-BE49-F238E27FC236}">
-                <a16:creationId xmlns:a16="http://schemas.microsoft.com/office/drawing/2014/main" id="{60363F98-F755-454D-8125-BA1A6CB9AA2E}"/>
-              </a:ext>
-            </a:extLst>
-          </p:cNvPr>
-          <p:cNvCxnSpPr>
-            <a:cxnSpLocks/>
-            <a:stCxn id="9" idx="2"/>
-          </p:cNvCxnSpPr>
-          <p:nvPr/>
-        </p:nvCxnSpPr>
-        <p:spPr>
-          <a:xfrm rot="5400000">
-            <a:off x="7836757" y="1819278"/>
-            <a:ext cx="1276795" cy="12700"/>
-          </a:xfrm>
-          <a:prstGeom prst="curvedConnector3">
-            <a:avLst>
-              <a:gd name="adj1" fmla="val 50000"/>
-            </a:avLst>
-          </a:prstGeom>
-        </p:spPr>
-        <p:style>
-          <a:lnRef idx="1">
-            <a:schemeClr val="accent1"/>
-          </a:lnRef>
-          <a:fillRef idx="0">
-            <a:schemeClr val="accent1"/>
-          </a:fillRef>
-          <a:effectRef idx="0">
-            <a:schemeClr val="accent1"/>
-          </a:effectRef>
-          <a:fontRef idx="minor">
-            <a:schemeClr val="tx1"/>
-          </a:fontRef>
-        </p:style>
-      </p:cxnSp>
-      <p:sp>
-        <p:nvSpPr>
-          <p:cNvPr id="18" name="Texto Explicativo: Linha com Borda e Ênfase 17">
-            <a:extLst>
-              <a:ext uri="{FF2B5EF4-FFF2-40B4-BE49-F238E27FC236}">
-                <a16:creationId xmlns:a16="http://schemas.microsoft.com/office/drawing/2014/main" id="{595BBEE4-0287-4CF7-BC14-9E7AFB45501B}"/>
-              </a:ext>
-            </a:extLst>
-          </p:cNvPr>
-          <p:cNvSpPr/>
-          <p:nvPr/>
-        </p:nvSpPr>
-        <p:spPr>
-          <a:xfrm>
-            <a:off x="8072224" y="5730579"/>
-            <a:ext cx="3896751" cy="972044"/>
-          </a:xfrm>
-          <a:prstGeom prst="accentBorderCallout1">
-            <a:avLst>
-              <a:gd name="adj1" fmla="val 2689"/>
-              <a:gd name="adj2" fmla="val 99393"/>
-              <a:gd name="adj3" fmla="val -513479"/>
-              <a:gd name="adj4" fmla="val 86540"/>
-            </a:avLst>
-          </a:prstGeom>
-          <a:solidFill>
-            <a:srgbClr val="FFFFCC"/>
-          </a:solidFill>
-        </p:spPr>
-        <p:style>
-          <a:lnRef idx="1">
-            <a:schemeClr val="accent4"/>
-          </a:lnRef>
-          <a:fillRef idx="2">
-            <a:schemeClr val="accent4"/>
-          </a:fillRef>
-          <a:effectRef idx="1">
-            <a:schemeClr val="accent4"/>
-          </a:effectRef>
-          <a:fontRef idx="minor">
-            <a:schemeClr val="dk1"/>
-          </a:fontRef>
-        </p:style>
-        <p:txBody>
-          <a:bodyPr rtlCol="0" anchor="ctr"/>
-          <a:lstStyle/>
-          <a:p>
-            <a:pPr algn="ctr"/>
-            <a:r>
-              <a:rPr lang="pt-BR" dirty="0"/>
-              <a:t>Estes são os cenários (objetivos do Fornecedor em interagir com o negócio “Smart Glass”)</a:t>
-            </a:r>
-          </a:p>
-        </p:txBody>
-      </p:sp>
-      <p:cxnSp>
-        <p:nvCxnSpPr>
-          <p:cNvPr id="24" name="Conector reto 23">
-            <a:extLst>
-              <a:ext uri="{FF2B5EF4-FFF2-40B4-BE49-F238E27FC236}">
-                <a16:creationId xmlns:a16="http://schemas.microsoft.com/office/drawing/2014/main" id="{19F138AD-CCDC-4B2A-8AB4-C430B698D2C5}"/>
-              </a:ext>
-            </a:extLst>
-          </p:cNvPr>
-          <p:cNvCxnSpPr>
-            <a:stCxn id="9" idx="3"/>
-          </p:cNvCxnSpPr>
-          <p:nvPr/>
-        </p:nvCxnSpPr>
-        <p:spPr>
-          <a:xfrm>
-            <a:off x="9143369" y="723681"/>
-            <a:ext cx="2308933" cy="1148"/>
-          </a:xfrm>
-          <a:prstGeom prst="line">
-            <a:avLst/>
-          </a:prstGeom>
-        </p:spPr>
-        <p:style>
-          <a:lnRef idx="1">
-            <a:schemeClr val="accent4"/>
-          </a:lnRef>
-          <a:fillRef idx="0">
-            <a:schemeClr val="accent4"/>
-          </a:fillRef>
-          <a:effectRef idx="0">
-            <a:schemeClr val="accent4"/>
-          </a:effectRef>
-          <a:fontRef idx="minor">
-            <a:schemeClr val="tx1"/>
-          </a:fontRef>
-        </p:style>
-      </p:cxnSp>
     </p:spTree>
     <p:extLst>
       <p:ext uri="{BB962C8B-B14F-4D97-AF65-F5344CB8AC3E}">
@@ -4351,7 +4095,7 @@
             <a:pPr algn="ctr"/>
             <a:r>
               <a:rPr lang="pt-BR" sz="1000" dirty="0"/>
-              <a:t>Vendedor</a:t>
+              <a:t>Vendas</a:t>
             </a:r>
           </a:p>
           <a:p>
@@ -4842,7 +4586,7 @@
         </p:nvSpPr>
         <p:spPr bwMode="auto">
           <a:xfrm>
-            <a:off x="7537797" y="3189570"/>
+            <a:off x="6847599" y="3158498"/>
             <a:ext cx="1627447" cy="584456"/>
           </a:xfrm>
           <a:prstGeom prst="cube">
@@ -4881,7 +4625,7 @@
             <a:pPr algn="ctr"/>
             <a:r>
               <a:rPr lang="pt-BR" sz="1000" dirty="0"/>
-              <a:t>Vendedor</a:t>
+              <a:t>Vendas</a:t>
             </a:r>
           </a:p>
           <a:p>
@@ -5065,9 +4809,9 @@
           <p:nvPr/>
         </p:nvCxnSpPr>
         <p:spPr>
-          <a:xfrm>
-            <a:off x="3371556" y="3554855"/>
-            <a:ext cx="4166241" cy="12700"/>
+          <a:xfrm flipV="1">
+            <a:off x="3371556" y="3523783"/>
+            <a:ext cx="3476043" cy="31072"/>
           </a:xfrm>
           <a:prstGeom prst="curvedConnector3">
             <a:avLst>
@@ -5278,8 +5022,8 @@
         </p:nvCxnSpPr>
         <p:spPr>
           <a:xfrm>
-            <a:off x="8278464" y="3774026"/>
-            <a:ext cx="2716" cy="522312"/>
+            <a:off x="7588266" y="3742954"/>
+            <a:ext cx="692914" cy="553384"/>
           </a:xfrm>
           <a:prstGeom prst="line">
             <a:avLst/>
@@ -5300,6 +5044,102 @@
           </a:fontRef>
         </p:style>
       </p:cxnSp>
+      <p:sp>
+        <p:nvSpPr>
+          <p:cNvPr id="11" name="Cubo 10">
+            <a:extLst>
+              <a:ext uri="{FF2B5EF4-FFF2-40B4-BE49-F238E27FC236}">
+                <a16:creationId xmlns:a16="http://schemas.microsoft.com/office/drawing/2014/main" id="{E14A796B-F149-414E-8BBD-33EDF74056D9}"/>
+              </a:ext>
+            </a:extLst>
+          </p:cNvPr>
+          <p:cNvSpPr/>
+          <p:nvPr/>
+        </p:nvSpPr>
+        <p:spPr bwMode="auto">
+          <a:xfrm>
+            <a:off x="8776477" y="3189570"/>
+            <a:ext cx="1278447" cy="584456"/>
+          </a:xfrm>
+          <a:prstGeom prst="cube">
+            <a:avLst/>
+          </a:prstGeom>
+          <a:solidFill>
+            <a:srgbClr val="FFC000"/>
+          </a:solidFill>
+          <a:ln>
+            <a:headEnd type="none" w="med" len="med"/>
+            <a:tailEnd type="none" w="med" len="med"/>
+          </a:ln>
+        </p:spPr>
+        <p:style>
+          <a:lnRef idx="2">
+            <a:schemeClr val="accent1"/>
+          </a:lnRef>
+          <a:fillRef idx="1">
+            <a:schemeClr val="lt1"/>
+          </a:fillRef>
+          <a:effectRef idx="0">
+            <a:schemeClr val="accent1"/>
+          </a:effectRef>
+          <a:fontRef idx="minor">
+            <a:schemeClr val="dk1"/>
+          </a:fontRef>
+        </p:style>
+        <p:txBody>
+          <a:bodyPr vert="horz" wrap="square" lIns="91440" tIns="45720" rIns="91440" bIns="45720" numCol="1" rtlCol="0" anchor="t" anchorCtr="0" compatLnSpc="1">
+            <a:prstTxWarp prst="textNoShape">
+              <a:avLst/>
+            </a:prstTxWarp>
+          </a:bodyPr>
+          <a:lstStyle/>
+          <a:p>
+            <a:pPr algn="ctr"/>
+            <a:r>
+              <a:rPr lang="pt-BR" sz="1000" dirty="0"/>
+              <a:t>Fabrica</a:t>
+            </a:r>
+          </a:p>
+          <a:p>
+            <a:pPr algn="ctr"/>
+            <a:r>
+              <a:rPr lang="pt-BR" sz="1000" b="1" dirty="0"/>
+              <a:t>(Nó Operacional)</a:t>
+            </a:r>
+          </a:p>
+          <a:p>
+            <a:pPr marL="0" marR="0" indent="0" algn="l" defTabSz="914400" rtl="0" eaLnBrk="1" fontAlgn="base" latinLnBrk="0" hangingPunct="1">
+              <a:lnSpc>
+                <a:spcPct val="100000"/>
+              </a:lnSpc>
+              <a:spcBef>
+                <a:spcPct val="0"/>
+              </a:spcBef>
+              <a:spcAft>
+                <a:spcPct val="0"/>
+              </a:spcAft>
+              <a:buClrTx/>
+              <a:buSzTx/>
+              <a:buFontTx/>
+              <a:buNone/>
+              <a:tabLst/>
+            </a:pPr>
+            <a:endParaRPr kumimoji="0" lang="pt-BR" sz="1000" b="0" i="0" u="none" strike="noStrike" cap="none" normalizeH="0" baseline="0" dirty="0">
+              <a:ln>
+                <a:noFill/>
+              </a:ln>
+              <a:solidFill>
+                <a:srgbClr val="000000"/>
+              </a:solidFill>
+              <a:effectLst/>
+              <a:latin typeface="Gill Sans" charset="0"/>
+              <a:ea typeface="ヒラギノ角ゴ ProN W3" charset="0"/>
+              <a:cs typeface="ヒラギノ角ゴ ProN W3" charset="0"/>
+              <a:sym typeface="Gill Sans" charset="0"/>
+            </a:endParaRPr>
+          </a:p>
+        </p:txBody>
+      </p:sp>
     </p:spTree>
     <p:extLst>
       <p:ext uri="{BB962C8B-B14F-4D97-AF65-F5344CB8AC3E}">
@@ -5411,7 +5251,7 @@
             <a:pPr algn="ctr"/>
             <a:r>
               <a:rPr lang="pt-BR" sz="1000" dirty="0"/>
-              <a:t>Técnico</a:t>
+              <a:t>Departamento Técnico</a:t>
             </a:r>
           </a:p>
           <a:p>
@@ -5950,7 +5790,7 @@
             <a:pPr algn="ctr"/>
             <a:r>
               <a:rPr lang="pt-BR" sz="1000" dirty="0"/>
-              <a:t>Técnico</a:t>
+              <a:t>Departamento Técnico</a:t>
             </a:r>
           </a:p>
           <a:p>
@@ -6374,2130 +6214,6 @@
     <p:extLst>
       <p:ext uri="{BB962C8B-B14F-4D97-AF65-F5344CB8AC3E}">
         <p14:creationId xmlns:p14="http://schemas.microsoft.com/office/powerpoint/2010/main" val="2019509926"/>
-      </p:ext>
-    </p:extLst>
-  </p:cSld>
-  <p:clrMapOvr>
-    <a:masterClrMapping/>
-  </p:clrMapOvr>
-</p:sld>
-</file>
-
-<file path=ppt/slides/slide6.xml><?xml version="1.0" encoding="utf-8"?>
-<p:sld xmlns:a="http://schemas.openxmlformats.org/drawingml/2006/main" xmlns:r="http://schemas.openxmlformats.org/officeDocument/2006/relationships" xmlns:p="http://schemas.openxmlformats.org/presentationml/2006/main">
-  <p:cSld>
-    <p:spTree>
-      <p:nvGrpSpPr>
-        <p:cNvPr id="1" name=""/>
-        <p:cNvGrpSpPr/>
-        <p:nvPr/>
-      </p:nvGrpSpPr>
-      <p:grpSpPr>
-        <a:xfrm>
-          <a:off x="0" y="0"/>
-          <a:ext cx="0" cy="0"/>
-          <a:chOff x="0" y="0"/>
-          <a:chExt cx="0" cy="0"/>
-        </a:xfrm>
-      </p:grpSpPr>
-      <p:sp>
-        <p:nvSpPr>
-          <p:cNvPr id="2" name="Título 1">
-            <a:extLst>
-              <a:ext uri="{FF2B5EF4-FFF2-40B4-BE49-F238E27FC236}">
-                <a16:creationId xmlns:a16="http://schemas.microsoft.com/office/drawing/2014/main" id="{F69B6DDA-DCD0-4989-908B-1BFDDB8F8DFB}"/>
-              </a:ext>
-            </a:extLst>
-          </p:cNvPr>
-          <p:cNvSpPr>
-            <a:spLocks noGrp="1"/>
-          </p:cNvSpPr>
-          <p:nvPr>
-            <p:ph type="title"/>
-          </p:nvPr>
-        </p:nvSpPr>
-        <p:spPr/>
-        <p:txBody>
-          <a:bodyPr/>
-          <a:lstStyle/>
-          <a:p>
-            <a:r>
-              <a:rPr lang="pt-BR" dirty="0"/>
-              <a:t>Cenário: Fornecer Orçamento</a:t>
-            </a:r>
-          </a:p>
-        </p:txBody>
-      </p:sp>
-      <p:sp>
-        <p:nvSpPr>
-          <p:cNvPr id="16" name="Cubo 15">
-            <a:extLst>
-              <a:ext uri="{FF2B5EF4-FFF2-40B4-BE49-F238E27FC236}">
-                <a16:creationId xmlns:a16="http://schemas.microsoft.com/office/drawing/2014/main" id="{98618C7C-3DA4-4764-9834-48BB32FA8E17}"/>
-              </a:ext>
-            </a:extLst>
-          </p:cNvPr>
-          <p:cNvSpPr/>
-          <p:nvPr/>
-        </p:nvSpPr>
-        <p:spPr bwMode="auto">
-          <a:xfrm>
-            <a:off x="8351520" y="3083198"/>
-            <a:ext cx="1627447" cy="584456"/>
-          </a:xfrm>
-          <a:prstGeom prst="cube">
-            <a:avLst/>
-          </a:prstGeom>
-          <a:solidFill>
-            <a:srgbClr val="FFC000"/>
-          </a:solidFill>
-          <a:ln>
-            <a:headEnd type="none" w="med" len="med"/>
-            <a:tailEnd type="none" w="med" len="med"/>
-          </a:ln>
-        </p:spPr>
-        <p:style>
-          <a:lnRef idx="2">
-            <a:schemeClr val="accent1"/>
-          </a:lnRef>
-          <a:fillRef idx="1">
-            <a:schemeClr val="lt1"/>
-          </a:fillRef>
-          <a:effectRef idx="0">
-            <a:schemeClr val="accent1"/>
-          </a:effectRef>
-          <a:fontRef idx="minor">
-            <a:schemeClr val="dk1"/>
-          </a:fontRef>
-        </p:style>
-        <p:txBody>
-          <a:bodyPr vert="horz" wrap="square" lIns="91440" tIns="45720" rIns="91440" bIns="45720" numCol="1" rtlCol="0" anchor="t" anchorCtr="0" compatLnSpc="1">
-            <a:prstTxWarp prst="textNoShape">
-              <a:avLst/>
-            </a:prstTxWarp>
-          </a:bodyPr>
-          <a:lstStyle/>
-          <a:p>
-            <a:pPr algn="ctr"/>
-            <a:r>
-              <a:rPr lang="pt-BR" sz="1000" dirty="0"/>
-              <a:t>Administrativo</a:t>
-            </a:r>
-          </a:p>
-          <a:p>
-            <a:pPr algn="ctr"/>
-            <a:r>
-              <a:rPr lang="pt-BR" sz="1000" b="1" dirty="0"/>
-              <a:t>(Nó Operacional)</a:t>
-            </a:r>
-          </a:p>
-          <a:p>
-            <a:pPr marL="0" marR="0" indent="0" algn="l" defTabSz="914400" rtl="0" eaLnBrk="1" fontAlgn="base" latinLnBrk="0" hangingPunct="1">
-              <a:lnSpc>
-                <a:spcPct val="100000"/>
-              </a:lnSpc>
-              <a:spcBef>
-                <a:spcPct val="0"/>
-              </a:spcBef>
-              <a:spcAft>
-                <a:spcPct val="0"/>
-              </a:spcAft>
-              <a:buClrTx/>
-              <a:buSzTx/>
-              <a:buFontTx/>
-              <a:buNone/>
-              <a:tabLst/>
-            </a:pPr>
-            <a:endParaRPr kumimoji="0" lang="pt-BR" sz="1000" b="0" i="0" u="none" strike="noStrike" cap="none" normalizeH="0" baseline="0" dirty="0">
-              <a:ln>
-                <a:noFill/>
-              </a:ln>
-              <a:solidFill>
-                <a:srgbClr val="000000"/>
-              </a:solidFill>
-              <a:effectLst/>
-              <a:latin typeface="Gill Sans" charset="0"/>
-              <a:ea typeface="ヒラギノ角ゴ ProN W3" charset="0"/>
-              <a:cs typeface="ヒラギノ角ゴ ProN W3" charset="0"/>
-              <a:sym typeface="Gill Sans" charset="0"/>
-            </a:endParaRPr>
-          </a:p>
-        </p:txBody>
-      </p:sp>
-      <p:sp>
-        <p:nvSpPr>
-          <p:cNvPr id="19" name="Retângulo de cantos arredondados 111">
-            <a:extLst>
-              <a:ext uri="{FF2B5EF4-FFF2-40B4-BE49-F238E27FC236}">
-                <a16:creationId xmlns:a16="http://schemas.microsoft.com/office/drawing/2014/main" id="{67FC9C97-6BBA-4BFC-A5E1-2436DE02BBE2}"/>
-              </a:ext>
-            </a:extLst>
-          </p:cNvPr>
-          <p:cNvSpPr/>
-          <p:nvPr/>
-        </p:nvSpPr>
-        <p:spPr>
-          <a:xfrm>
-            <a:off x="8332474" y="4196205"/>
-            <a:ext cx="1523287" cy="538383"/>
-          </a:xfrm>
-          <a:prstGeom prst="roundRect">
-            <a:avLst/>
-          </a:prstGeom>
-          <a:scene3d>
-            <a:camera prst="orthographicFront">
-              <a:rot lat="0" lon="0" rev="0"/>
-            </a:camera>
-            <a:lightRig rig="contrasting" dir="t">
-              <a:rot lat="0" lon="0" rev="1200000"/>
-            </a:lightRig>
-          </a:scene3d>
-          <a:sp3d contourW="19050" prstMaterial="metal">
-            <a:bevelT w="88900" h="203200"/>
-            <a:bevelB w="165100" h="254000"/>
-          </a:sp3d>
-        </p:spPr>
-        <p:style>
-          <a:lnRef idx="0">
-            <a:schemeClr val="lt1">
-              <a:hueOff val="0"/>
-              <a:satOff val="0"/>
-              <a:lumOff val="0"/>
-              <a:alphaOff val="0"/>
-            </a:schemeClr>
-          </a:lnRef>
-          <a:fillRef idx="1">
-            <a:schemeClr val="accent6">
-              <a:hueOff val="0"/>
-              <a:satOff val="0"/>
-              <a:lumOff val="0"/>
-              <a:alphaOff val="0"/>
-            </a:schemeClr>
-          </a:fillRef>
-          <a:effectRef idx="1">
-            <a:schemeClr val="accent6">
-              <a:hueOff val="0"/>
-              <a:satOff val="0"/>
-              <a:lumOff val="0"/>
-              <a:alphaOff val="0"/>
-            </a:schemeClr>
-          </a:effectRef>
-          <a:fontRef idx="minor">
-            <a:schemeClr val="lt1"/>
-          </a:fontRef>
-        </p:style>
-        <p:txBody>
-          <a:bodyPr rtlCol="0" anchor="ctr"/>
-          <a:lstStyle/>
-          <a:p>
-            <a:pPr algn="ctr"/>
-            <a:r>
-              <a:rPr lang="pt-BR" sz="1200" b="1" dirty="0"/>
-              <a:t>Obter Orçamento</a:t>
-            </a:r>
-            <a:endParaRPr lang="pt-BR" sz="1200" dirty="0"/>
-          </a:p>
-        </p:txBody>
-      </p:sp>
-      <p:sp>
-        <p:nvSpPr>
-          <p:cNvPr id="23" name="Retângulo 22">
-            <a:extLst>
-              <a:ext uri="{FF2B5EF4-FFF2-40B4-BE49-F238E27FC236}">
-                <a16:creationId xmlns:a16="http://schemas.microsoft.com/office/drawing/2014/main" id="{60488A81-F715-4F1B-B2A8-84FD4A5E863D}"/>
-              </a:ext>
-            </a:extLst>
-          </p:cNvPr>
-          <p:cNvSpPr/>
-          <p:nvPr/>
-        </p:nvSpPr>
-        <p:spPr>
-          <a:xfrm>
-            <a:off x="8485877" y="365125"/>
-            <a:ext cx="1336431" cy="914400"/>
-          </a:xfrm>
-          <a:prstGeom prst="rect">
-            <a:avLst/>
-          </a:prstGeom>
-        </p:spPr>
-        <p:style>
-          <a:lnRef idx="2">
-            <a:schemeClr val="accent1">
-              <a:shade val="50000"/>
-            </a:schemeClr>
-          </a:lnRef>
-          <a:fillRef idx="1">
-            <a:schemeClr val="accent1"/>
-          </a:fillRef>
-          <a:effectRef idx="0">
-            <a:schemeClr val="accent1"/>
-          </a:effectRef>
-          <a:fontRef idx="minor">
-            <a:schemeClr val="lt1"/>
-          </a:fontRef>
-        </p:style>
-        <p:txBody>
-          <a:bodyPr rtlCol="0" anchor="ctr"/>
-          <a:lstStyle/>
-          <a:p>
-            <a:pPr algn="ctr"/>
-            <a:r>
-              <a:rPr lang="pt-BR" dirty="0"/>
-              <a:t>Fornecedor</a:t>
-            </a:r>
-          </a:p>
-        </p:txBody>
-      </p:sp>
-      <p:cxnSp>
-        <p:nvCxnSpPr>
-          <p:cNvPr id="24" name="Conector: Curvo 23">
-            <a:extLst>
-              <a:ext uri="{FF2B5EF4-FFF2-40B4-BE49-F238E27FC236}">
-                <a16:creationId xmlns:a16="http://schemas.microsoft.com/office/drawing/2014/main" id="{44A9E956-499F-4429-8233-C6931F55333B}"/>
-              </a:ext>
-            </a:extLst>
-          </p:cNvPr>
-          <p:cNvCxnSpPr>
-            <a:cxnSpLocks/>
-            <a:stCxn id="23" idx="2"/>
-            <a:endCxn id="26" idx="0"/>
-          </p:cNvCxnSpPr>
-          <p:nvPr/>
-        </p:nvCxnSpPr>
-        <p:spPr>
-          <a:xfrm rot="16200000" flipH="1">
-            <a:off x="8605696" y="1827921"/>
-            <a:ext cx="1107944" cy="11151"/>
-          </a:xfrm>
-          <a:prstGeom prst="curvedConnector3">
-            <a:avLst>
-              <a:gd name="adj1" fmla="val 50000"/>
-            </a:avLst>
-          </a:prstGeom>
-        </p:spPr>
-        <p:style>
-          <a:lnRef idx="1">
-            <a:schemeClr val="accent1"/>
-          </a:lnRef>
-          <a:fillRef idx="0">
-            <a:schemeClr val="accent1"/>
-          </a:fillRef>
-          <a:effectRef idx="0">
-            <a:schemeClr val="accent1"/>
-          </a:effectRef>
-          <a:fontRef idx="minor">
-            <a:schemeClr val="tx1"/>
-          </a:fontRef>
-        </p:style>
-      </p:cxnSp>
-      <p:sp>
-        <p:nvSpPr>
-          <p:cNvPr id="26" name="Retângulo: Cantos Arredondados 25">
-            <a:extLst>
-              <a:ext uri="{FF2B5EF4-FFF2-40B4-BE49-F238E27FC236}">
-                <a16:creationId xmlns:a16="http://schemas.microsoft.com/office/drawing/2014/main" id="{0CC10807-6876-4F24-9E71-B543D1F8799A}"/>
-              </a:ext>
-            </a:extLst>
-          </p:cNvPr>
-          <p:cNvSpPr/>
-          <p:nvPr/>
-        </p:nvSpPr>
-        <p:spPr>
-          <a:xfrm>
-            <a:off x="7359890" y="2387469"/>
-            <a:ext cx="3610708" cy="2875670"/>
-          </a:xfrm>
-          <a:prstGeom prst="roundRect">
-            <a:avLst/>
-          </a:prstGeom>
-          <a:noFill/>
-        </p:spPr>
-        <p:style>
-          <a:lnRef idx="2">
-            <a:schemeClr val="accent1">
-              <a:shade val="50000"/>
-            </a:schemeClr>
-          </a:lnRef>
-          <a:fillRef idx="1">
-            <a:schemeClr val="accent1"/>
-          </a:fillRef>
-          <a:effectRef idx="0">
-            <a:schemeClr val="accent1"/>
-          </a:effectRef>
-          <a:fontRef idx="minor">
-            <a:schemeClr val="lt1"/>
-          </a:fontRef>
-        </p:style>
-        <p:txBody>
-          <a:bodyPr rtlCol="0" anchor="t" anchorCtr="0"/>
-          <a:lstStyle/>
-          <a:p>
-            <a:pPr algn="ctr"/>
-            <a:r>
-              <a:rPr lang="pt-BR" dirty="0">
-                <a:solidFill>
-                  <a:schemeClr val="tx1"/>
-                </a:solidFill>
-              </a:rPr>
-              <a:t>Smart Glass</a:t>
-            </a:r>
-          </a:p>
-        </p:txBody>
-      </p:sp>
-      <p:sp>
-        <p:nvSpPr>
-          <p:cNvPr id="30" name="Texto Explicativo: Linha com Borda e Ênfase 29">
-            <a:extLst>
-              <a:ext uri="{FF2B5EF4-FFF2-40B4-BE49-F238E27FC236}">
-                <a16:creationId xmlns:a16="http://schemas.microsoft.com/office/drawing/2014/main" id="{1D920C9D-0880-4BB2-91D0-FA1A972BB24C}"/>
-              </a:ext>
-            </a:extLst>
-          </p:cNvPr>
-          <p:cNvSpPr/>
-          <p:nvPr/>
-        </p:nvSpPr>
-        <p:spPr>
-          <a:xfrm>
-            <a:off x="2304127" y="1833496"/>
-            <a:ext cx="3896751" cy="972044"/>
-          </a:xfrm>
-          <a:prstGeom prst="accentBorderCallout1">
-            <a:avLst>
-              <a:gd name="adj1" fmla="val 39011"/>
-              <a:gd name="adj2" fmla="val 102497"/>
-              <a:gd name="adj3" fmla="val 163153"/>
-              <a:gd name="adj4" fmla="val 157034"/>
-            </a:avLst>
-          </a:prstGeom>
-          <a:solidFill>
-            <a:srgbClr val="FFFFCC"/>
-          </a:solidFill>
-        </p:spPr>
-        <p:style>
-          <a:lnRef idx="1">
-            <a:schemeClr val="accent4"/>
-          </a:lnRef>
-          <a:fillRef idx="2">
-            <a:schemeClr val="accent4"/>
-          </a:fillRef>
-          <a:effectRef idx="1">
-            <a:schemeClr val="accent4"/>
-          </a:effectRef>
-          <a:fontRef idx="minor">
-            <a:schemeClr val="dk1"/>
-          </a:fontRef>
-        </p:style>
-        <p:txBody>
-          <a:bodyPr rtlCol="0" anchor="ctr"/>
-          <a:lstStyle/>
-          <a:p>
-            <a:pPr algn="ctr"/>
-            <a:r>
-              <a:rPr lang="pt-BR" dirty="0"/>
-              <a:t>Neste cenário, o Fornecedor interage com o Administrativo (Nó Operacional)</a:t>
-            </a:r>
-          </a:p>
-        </p:txBody>
-      </p:sp>
-      <p:sp>
-        <p:nvSpPr>
-          <p:cNvPr id="32" name="Texto Explicativo: Linha com Borda e Ênfase 31">
-            <a:extLst>
-              <a:ext uri="{FF2B5EF4-FFF2-40B4-BE49-F238E27FC236}">
-                <a16:creationId xmlns:a16="http://schemas.microsoft.com/office/drawing/2014/main" id="{CFB097E5-A0A7-4453-AECF-AE3EC341F437}"/>
-              </a:ext>
-            </a:extLst>
-          </p:cNvPr>
-          <p:cNvSpPr/>
-          <p:nvPr/>
-        </p:nvSpPr>
-        <p:spPr>
-          <a:xfrm>
-            <a:off x="2910468" y="5520831"/>
-            <a:ext cx="4304773" cy="972044"/>
-          </a:xfrm>
-          <a:prstGeom prst="accentBorderCallout1">
-            <a:avLst>
-              <a:gd name="adj1" fmla="val 28880"/>
-              <a:gd name="adj2" fmla="val 102497"/>
-              <a:gd name="adj3" fmla="val -87217"/>
-              <a:gd name="adj4" fmla="val 128515"/>
-            </a:avLst>
-          </a:prstGeom>
-          <a:solidFill>
-            <a:srgbClr val="FFFFCC"/>
-          </a:solidFill>
-        </p:spPr>
-        <p:style>
-          <a:lnRef idx="1">
-            <a:schemeClr val="accent4"/>
-          </a:lnRef>
-          <a:fillRef idx="2">
-            <a:schemeClr val="accent4"/>
-          </a:fillRef>
-          <a:effectRef idx="1">
-            <a:schemeClr val="accent4"/>
-          </a:effectRef>
-          <a:fontRef idx="minor">
-            <a:schemeClr val="dk1"/>
-          </a:fontRef>
-        </p:style>
-        <p:txBody>
-          <a:bodyPr rtlCol="0" anchor="ctr"/>
-          <a:lstStyle/>
-          <a:p>
-            <a:pPr algn="ctr"/>
-            <a:r>
-              <a:rPr lang="pt-BR" dirty="0"/>
-              <a:t>O Administrativo (Nó Operacional) necessita, neste cenário, da capacidade de </a:t>
-            </a:r>
-          </a:p>
-          <a:p>
-            <a:pPr algn="ctr"/>
-            <a:r>
-              <a:rPr lang="pt-BR" dirty="0"/>
-              <a:t>“Obter Orçamento”</a:t>
-            </a:r>
-          </a:p>
-        </p:txBody>
-      </p:sp>
-      <p:cxnSp>
-        <p:nvCxnSpPr>
-          <p:cNvPr id="34" name="Conector reto 33">
-            <a:extLst>
-              <a:ext uri="{FF2B5EF4-FFF2-40B4-BE49-F238E27FC236}">
-                <a16:creationId xmlns:a16="http://schemas.microsoft.com/office/drawing/2014/main" id="{59DADD7E-FDEE-4062-8BCD-3A38A85A4179}"/>
-              </a:ext>
-            </a:extLst>
-          </p:cNvPr>
-          <p:cNvCxnSpPr>
-            <a:cxnSpLocks/>
-            <a:stCxn id="16" idx="3"/>
-            <a:endCxn id="19" idx="0"/>
-          </p:cNvCxnSpPr>
-          <p:nvPr/>
-        </p:nvCxnSpPr>
-        <p:spPr>
-          <a:xfrm>
-            <a:off x="9092187" y="3667654"/>
-            <a:ext cx="1931" cy="528551"/>
-          </a:xfrm>
-          <a:prstGeom prst="line">
-            <a:avLst/>
-          </a:prstGeom>
-        </p:spPr>
-        <p:style>
-          <a:lnRef idx="1">
-            <a:schemeClr val="accent1"/>
-          </a:lnRef>
-          <a:fillRef idx="0">
-            <a:schemeClr val="accent1"/>
-          </a:fillRef>
-          <a:effectRef idx="0">
-            <a:schemeClr val="accent1"/>
-          </a:effectRef>
-          <a:fontRef idx="minor">
-            <a:schemeClr val="tx1"/>
-          </a:fontRef>
-        </p:style>
-      </p:cxnSp>
-    </p:spTree>
-    <p:extLst>
-      <p:ext uri="{BB962C8B-B14F-4D97-AF65-F5344CB8AC3E}">
-        <p14:creationId xmlns:p14="http://schemas.microsoft.com/office/powerpoint/2010/main" val="1226745092"/>
-      </p:ext>
-    </p:extLst>
-  </p:cSld>
-  <p:clrMapOvr>
-    <a:masterClrMapping/>
-  </p:clrMapOvr>
-</p:sld>
-</file>
-
-<file path=ppt/slides/slide7.xml><?xml version="1.0" encoding="utf-8"?>
-<p:sld xmlns:a="http://schemas.openxmlformats.org/drawingml/2006/main" xmlns:r="http://schemas.openxmlformats.org/officeDocument/2006/relationships" xmlns:p="http://schemas.openxmlformats.org/presentationml/2006/main">
-  <p:cSld>
-    <p:spTree>
-      <p:nvGrpSpPr>
-        <p:cNvPr id="1" name=""/>
-        <p:cNvGrpSpPr/>
-        <p:nvPr/>
-      </p:nvGrpSpPr>
-      <p:grpSpPr>
-        <a:xfrm>
-          <a:off x="0" y="0"/>
-          <a:ext cx="0" cy="0"/>
-          <a:chOff x="0" y="0"/>
-          <a:chExt cx="0" cy="0"/>
-        </a:xfrm>
-      </p:grpSpPr>
-      <p:sp>
-        <p:nvSpPr>
-          <p:cNvPr id="2" name="Título 1">
-            <a:extLst>
-              <a:ext uri="{FF2B5EF4-FFF2-40B4-BE49-F238E27FC236}">
-                <a16:creationId xmlns:a16="http://schemas.microsoft.com/office/drawing/2014/main" id="{F69B6DDA-DCD0-4989-908B-1BFDDB8F8DFB}"/>
-              </a:ext>
-            </a:extLst>
-          </p:cNvPr>
-          <p:cNvSpPr>
-            <a:spLocks noGrp="1"/>
-          </p:cNvSpPr>
-          <p:nvPr>
-            <p:ph type="title"/>
-          </p:nvPr>
-        </p:nvSpPr>
-        <p:spPr/>
-        <p:txBody>
-          <a:bodyPr/>
-          <a:lstStyle/>
-          <a:p>
-            <a:r>
-              <a:rPr lang="pt-BR" dirty="0"/>
-              <a:t>Cenário: Vender</a:t>
-            </a:r>
-          </a:p>
-        </p:txBody>
-      </p:sp>
-      <p:sp>
-        <p:nvSpPr>
-          <p:cNvPr id="16" name="Cubo 15">
-            <a:extLst>
-              <a:ext uri="{FF2B5EF4-FFF2-40B4-BE49-F238E27FC236}">
-                <a16:creationId xmlns:a16="http://schemas.microsoft.com/office/drawing/2014/main" id="{98618C7C-3DA4-4764-9834-48BB32FA8E17}"/>
-              </a:ext>
-            </a:extLst>
-          </p:cNvPr>
-          <p:cNvSpPr/>
-          <p:nvPr/>
-        </p:nvSpPr>
-        <p:spPr bwMode="auto">
-          <a:xfrm>
-            <a:off x="8351520" y="3083198"/>
-            <a:ext cx="1627447" cy="584456"/>
-          </a:xfrm>
-          <a:prstGeom prst="cube">
-            <a:avLst/>
-          </a:prstGeom>
-          <a:solidFill>
-            <a:srgbClr val="FFC000"/>
-          </a:solidFill>
-          <a:ln>
-            <a:headEnd type="none" w="med" len="med"/>
-            <a:tailEnd type="none" w="med" len="med"/>
-          </a:ln>
-        </p:spPr>
-        <p:style>
-          <a:lnRef idx="2">
-            <a:schemeClr val="accent1"/>
-          </a:lnRef>
-          <a:fillRef idx="1">
-            <a:schemeClr val="lt1"/>
-          </a:fillRef>
-          <a:effectRef idx="0">
-            <a:schemeClr val="accent1"/>
-          </a:effectRef>
-          <a:fontRef idx="minor">
-            <a:schemeClr val="dk1"/>
-          </a:fontRef>
-        </p:style>
-        <p:txBody>
-          <a:bodyPr vert="horz" wrap="square" lIns="91440" tIns="45720" rIns="91440" bIns="45720" numCol="1" rtlCol="0" anchor="t" anchorCtr="0" compatLnSpc="1">
-            <a:prstTxWarp prst="textNoShape">
-              <a:avLst/>
-            </a:prstTxWarp>
-          </a:bodyPr>
-          <a:lstStyle/>
-          <a:p>
-            <a:pPr algn="ctr"/>
-            <a:r>
-              <a:rPr lang="pt-BR" sz="1000" dirty="0"/>
-              <a:t>Administrativo</a:t>
-            </a:r>
-          </a:p>
-          <a:p>
-            <a:pPr algn="ctr"/>
-            <a:r>
-              <a:rPr lang="pt-BR" sz="1000" b="1" dirty="0"/>
-              <a:t>(Nó Operacional)</a:t>
-            </a:r>
-          </a:p>
-          <a:p>
-            <a:pPr marL="0" marR="0" indent="0" algn="l" defTabSz="914400" rtl="0" eaLnBrk="1" fontAlgn="base" latinLnBrk="0" hangingPunct="1">
-              <a:lnSpc>
-                <a:spcPct val="100000"/>
-              </a:lnSpc>
-              <a:spcBef>
-                <a:spcPct val="0"/>
-              </a:spcBef>
-              <a:spcAft>
-                <a:spcPct val="0"/>
-              </a:spcAft>
-              <a:buClrTx/>
-              <a:buSzTx/>
-              <a:buFontTx/>
-              <a:buNone/>
-              <a:tabLst/>
-            </a:pPr>
-            <a:endParaRPr kumimoji="0" lang="pt-BR" sz="1000" b="0" i="0" u="none" strike="noStrike" cap="none" normalizeH="0" baseline="0" dirty="0">
-              <a:ln>
-                <a:noFill/>
-              </a:ln>
-              <a:solidFill>
-                <a:srgbClr val="000000"/>
-              </a:solidFill>
-              <a:effectLst/>
-              <a:latin typeface="Gill Sans" charset="0"/>
-              <a:ea typeface="ヒラギノ角ゴ ProN W3" charset="0"/>
-              <a:cs typeface="ヒラギノ角ゴ ProN W3" charset="0"/>
-              <a:sym typeface="Gill Sans" charset="0"/>
-            </a:endParaRPr>
-          </a:p>
-        </p:txBody>
-      </p:sp>
-      <p:sp>
-        <p:nvSpPr>
-          <p:cNvPr id="19" name="Retângulo de cantos arredondados 111">
-            <a:extLst>
-              <a:ext uri="{FF2B5EF4-FFF2-40B4-BE49-F238E27FC236}">
-                <a16:creationId xmlns:a16="http://schemas.microsoft.com/office/drawing/2014/main" id="{67FC9C97-6BBA-4BFC-A5E1-2436DE02BBE2}"/>
-              </a:ext>
-            </a:extLst>
-          </p:cNvPr>
-          <p:cNvSpPr/>
-          <p:nvPr/>
-        </p:nvSpPr>
-        <p:spPr>
-          <a:xfrm>
-            <a:off x="8310172" y="4196205"/>
-            <a:ext cx="1523287" cy="538383"/>
-          </a:xfrm>
-          <a:prstGeom prst="roundRect">
-            <a:avLst/>
-          </a:prstGeom>
-          <a:scene3d>
-            <a:camera prst="orthographicFront">
-              <a:rot lat="0" lon="0" rev="0"/>
-            </a:camera>
-            <a:lightRig rig="contrasting" dir="t">
-              <a:rot lat="0" lon="0" rev="1200000"/>
-            </a:lightRig>
-          </a:scene3d>
-          <a:sp3d contourW="19050" prstMaterial="metal">
-            <a:bevelT w="88900" h="203200"/>
-            <a:bevelB w="165100" h="254000"/>
-          </a:sp3d>
-        </p:spPr>
-        <p:style>
-          <a:lnRef idx="0">
-            <a:schemeClr val="lt1">
-              <a:hueOff val="0"/>
-              <a:satOff val="0"/>
-              <a:lumOff val="0"/>
-              <a:alphaOff val="0"/>
-            </a:schemeClr>
-          </a:lnRef>
-          <a:fillRef idx="1">
-            <a:schemeClr val="accent6">
-              <a:hueOff val="0"/>
-              <a:satOff val="0"/>
-              <a:lumOff val="0"/>
-              <a:alphaOff val="0"/>
-            </a:schemeClr>
-          </a:fillRef>
-          <a:effectRef idx="1">
-            <a:schemeClr val="accent6">
-              <a:hueOff val="0"/>
-              <a:satOff val="0"/>
-              <a:lumOff val="0"/>
-              <a:alphaOff val="0"/>
-            </a:schemeClr>
-          </a:effectRef>
-          <a:fontRef idx="minor">
-            <a:schemeClr val="lt1"/>
-          </a:fontRef>
-        </p:style>
-        <p:txBody>
-          <a:bodyPr rtlCol="0" anchor="ctr"/>
-          <a:lstStyle/>
-          <a:p>
-            <a:pPr algn="ctr"/>
-            <a:r>
-              <a:rPr lang="pt-BR" sz="1200" b="1" dirty="0"/>
-              <a:t>Tratar compra do produto</a:t>
-            </a:r>
-            <a:endParaRPr lang="pt-BR" sz="1200" dirty="0"/>
-          </a:p>
-        </p:txBody>
-      </p:sp>
-      <p:sp>
-        <p:nvSpPr>
-          <p:cNvPr id="23" name="Retângulo 22">
-            <a:extLst>
-              <a:ext uri="{FF2B5EF4-FFF2-40B4-BE49-F238E27FC236}">
-                <a16:creationId xmlns:a16="http://schemas.microsoft.com/office/drawing/2014/main" id="{60488A81-F715-4F1B-B2A8-84FD4A5E863D}"/>
-              </a:ext>
-            </a:extLst>
-          </p:cNvPr>
-          <p:cNvSpPr/>
-          <p:nvPr/>
-        </p:nvSpPr>
-        <p:spPr>
-          <a:xfrm>
-            <a:off x="8485877" y="365125"/>
-            <a:ext cx="1336431" cy="914400"/>
-          </a:xfrm>
-          <a:prstGeom prst="rect">
-            <a:avLst/>
-          </a:prstGeom>
-        </p:spPr>
-        <p:style>
-          <a:lnRef idx="2">
-            <a:schemeClr val="accent1">
-              <a:shade val="50000"/>
-            </a:schemeClr>
-          </a:lnRef>
-          <a:fillRef idx="1">
-            <a:schemeClr val="accent1"/>
-          </a:fillRef>
-          <a:effectRef idx="0">
-            <a:schemeClr val="accent1"/>
-          </a:effectRef>
-          <a:fontRef idx="minor">
-            <a:schemeClr val="lt1"/>
-          </a:fontRef>
-        </p:style>
-        <p:txBody>
-          <a:bodyPr rtlCol="0" anchor="ctr"/>
-          <a:lstStyle/>
-          <a:p>
-            <a:pPr algn="ctr"/>
-            <a:r>
-              <a:rPr lang="pt-BR" dirty="0"/>
-              <a:t>Fornecedor</a:t>
-            </a:r>
-          </a:p>
-        </p:txBody>
-      </p:sp>
-      <p:cxnSp>
-        <p:nvCxnSpPr>
-          <p:cNvPr id="24" name="Conector: Curvo 23">
-            <a:extLst>
-              <a:ext uri="{FF2B5EF4-FFF2-40B4-BE49-F238E27FC236}">
-                <a16:creationId xmlns:a16="http://schemas.microsoft.com/office/drawing/2014/main" id="{44A9E956-499F-4429-8233-C6931F55333B}"/>
-              </a:ext>
-            </a:extLst>
-          </p:cNvPr>
-          <p:cNvCxnSpPr>
-            <a:cxnSpLocks/>
-            <a:stCxn id="23" idx="2"/>
-            <a:endCxn id="26" idx="0"/>
-          </p:cNvCxnSpPr>
-          <p:nvPr/>
-        </p:nvCxnSpPr>
-        <p:spPr>
-          <a:xfrm rot="16200000" flipH="1">
-            <a:off x="8605696" y="1827921"/>
-            <a:ext cx="1107944" cy="11151"/>
-          </a:xfrm>
-          <a:prstGeom prst="curvedConnector3">
-            <a:avLst>
-              <a:gd name="adj1" fmla="val 50000"/>
-            </a:avLst>
-          </a:prstGeom>
-        </p:spPr>
-        <p:style>
-          <a:lnRef idx="1">
-            <a:schemeClr val="accent1"/>
-          </a:lnRef>
-          <a:fillRef idx="0">
-            <a:schemeClr val="accent1"/>
-          </a:fillRef>
-          <a:effectRef idx="0">
-            <a:schemeClr val="accent1"/>
-          </a:effectRef>
-          <a:fontRef idx="minor">
-            <a:schemeClr val="tx1"/>
-          </a:fontRef>
-        </p:style>
-      </p:cxnSp>
-      <p:sp>
-        <p:nvSpPr>
-          <p:cNvPr id="26" name="Retângulo: Cantos Arredondados 25">
-            <a:extLst>
-              <a:ext uri="{FF2B5EF4-FFF2-40B4-BE49-F238E27FC236}">
-                <a16:creationId xmlns:a16="http://schemas.microsoft.com/office/drawing/2014/main" id="{0CC10807-6876-4F24-9E71-B543D1F8799A}"/>
-              </a:ext>
-            </a:extLst>
-          </p:cNvPr>
-          <p:cNvSpPr/>
-          <p:nvPr/>
-        </p:nvSpPr>
-        <p:spPr>
-          <a:xfrm>
-            <a:off x="7359890" y="2387469"/>
-            <a:ext cx="3610708" cy="2875670"/>
-          </a:xfrm>
-          <a:prstGeom prst="roundRect">
-            <a:avLst/>
-          </a:prstGeom>
-          <a:noFill/>
-        </p:spPr>
-        <p:style>
-          <a:lnRef idx="2">
-            <a:schemeClr val="accent1">
-              <a:shade val="50000"/>
-            </a:schemeClr>
-          </a:lnRef>
-          <a:fillRef idx="1">
-            <a:schemeClr val="accent1"/>
-          </a:fillRef>
-          <a:effectRef idx="0">
-            <a:schemeClr val="accent1"/>
-          </a:effectRef>
-          <a:fontRef idx="minor">
-            <a:schemeClr val="lt1"/>
-          </a:fontRef>
-        </p:style>
-        <p:txBody>
-          <a:bodyPr rtlCol="0" anchor="t" anchorCtr="0"/>
-          <a:lstStyle/>
-          <a:p>
-            <a:pPr algn="ctr"/>
-            <a:r>
-              <a:rPr lang="pt-BR" dirty="0">
-                <a:solidFill>
-                  <a:schemeClr val="tx1"/>
-                </a:solidFill>
-              </a:rPr>
-              <a:t>Smart Glass</a:t>
-            </a:r>
-          </a:p>
-        </p:txBody>
-      </p:sp>
-      <p:sp>
-        <p:nvSpPr>
-          <p:cNvPr id="30" name="Texto Explicativo: Linha com Borda e Ênfase 29">
-            <a:extLst>
-              <a:ext uri="{FF2B5EF4-FFF2-40B4-BE49-F238E27FC236}">
-                <a16:creationId xmlns:a16="http://schemas.microsoft.com/office/drawing/2014/main" id="{1D920C9D-0880-4BB2-91D0-FA1A972BB24C}"/>
-              </a:ext>
-            </a:extLst>
-          </p:cNvPr>
-          <p:cNvSpPr/>
-          <p:nvPr/>
-        </p:nvSpPr>
-        <p:spPr>
-          <a:xfrm>
-            <a:off x="2304127" y="1833496"/>
-            <a:ext cx="3896751" cy="972044"/>
-          </a:xfrm>
-          <a:prstGeom prst="accentBorderCallout1">
-            <a:avLst>
-              <a:gd name="adj1" fmla="val 39011"/>
-              <a:gd name="adj2" fmla="val 102497"/>
-              <a:gd name="adj3" fmla="val 163153"/>
-              <a:gd name="adj4" fmla="val 157034"/>
-            </a:avLst>
-          </a:prstGeom>
-          <a:solidFill>
-            <a:srgbClr val="FFFFCC"/>
-          </a:solidFill>
-        </p:spPr>
-        <p:style>
-          <a:lnRef idx="1">
-            <a:schemeClr val="accent4"/>
-          </a:lnRef>
-          <a:fillRef idx="2">
-            <a:schemeClr val="accent4"/>
-          </a:fillRef>
-          <a:effectRef idx="1">
-            <a:schemeClr val="accent4"/>
-          </a:effectRef>
-          <a:fontRef idx="minor">
-            <a:schemeClr val="dk1"/>
-          </a:fontRef>
-        </p:style>
-        <p:txBody>
-          <a:bodyPr rtlCol="0" anchor="ctr"/>
-          <a:lstStyle/>
-          <a:p>
-            <a:pPr algn="ctr"/>
-            <a:r>
-              <a:rPr lang="pt-BR" dirty="0"/>
-              <a:t>Neste cenário, o Fornecedor interage com o Administrativo (Nó Operacional)</a:t>
-            </a:r>
-          </a:p>
-        </p:txBody>
-      </p:sp>
-      <p:sp>
-        <p:nvSpPr>
-          <p:cNvPr id="32" name="Texto Explicativo: Linha com Borda e Ênfase 31">
-            <a:extLst>
-              <a:ext uri="{FF2B5EF4-FFF2-40B4-BE49-F238E27FC236}">
-                <a16:creationId xmlns:a16="http://schemas.microsoft.com/office/drawing/2014/main" id="{CFB097E5-A0A7-4453-AECF-AE3EC341F437}"/>
-              </a:ext>
-            </a:extLst>
-          </p:cNvPr>
-          <p:cNvSpPr/>
-          <p:nvPr/>
-        </p:nvSpPr>
-        <p:spPr>
-          <a:xfrm>
-            <a:off x="2910468" y="5520831"/>
-            <a:ext cx="4304773" cy="972044"/>
-          </a:xfrm>
-          <a:prstGeom prst="accentBorderCallout1">
-            <a:avLst>
-              <a:gd name="adj1" fmla="val 28880"/>
-              <a:gd name="adj2" fmla="val 102497"/>
-              <a:gd name="adj3" fmla="val -87217"/>
-              <a:gd name="adj4" fmla="val 128515"/>
-            </a:avLst>
-          </a:prstGeom>
-          <a:solidFill>
-            <a:srgbClr val="FFFFCC"/>
-          </a:solidFill>
-        </p:spPr>
-        <p:style>
-          <a:lnRef idx="1">
-            <a:schemeClr val="accent4"/>
-          </a:lnRef>
-          <a:fillRef idx="2">
-            <a:schemeClr val="accent4"/>
-          </a:fillRef>
-          <a:effectRef idx="1">
-            <a:schemeClr val="accent4"/>
-          </a:effectRef>
-          <a:fontRef idx="minor">
-            <a:schemeClr val="dk1"/>
-          </a:fontRef>
-        </p:style>
-        <p:txBody>
-          <a:bodyPr rtlCol="0" anchor="ctr"/>
-          <a:lstStyle/>
-          <a:p>
-            <a:pPr algn="ctr"/>
-            <a:r>
-              <a:rPr lang="pt-BR" dirty="0"/>
-              <a:t>O Administrativo (Nó Operacional) necessita, neste cenário, da capacidade de </a:t>
-            </a:r>
-          </a:p>
-          <a:p>
-            <a:pPr algn="ctr"/>
-            <a:r>
-              <a:rPr lang="pt-BR" dirty="0"/>
-              <a:t>“Tratar compra do produto”</a:t>
-            </a:r>
-          </a:p>
-        </p:txBody>
-      </p:sp>
-      <p:cxnSp>
-        <p:nvCxnSpPr>
-          <p:cNvPr id="34" name="Conector reto 33">
-            <a:extLst>
-              <a:ext uri="{FF2B5EF4-FFF2-40B4-BE49-F238E27FC236}">
-                <a16:creationId xmlns:a16="http://schemas.microsoft.com/office/drawing/2014/main" id="{59DADD7E-FDEE-4062-8BCD-3A38A85A4179}"/>
-              </a:ext>
-            </a:extLst>
-          </p:cNvPr>
-          <p:cNvCxnSpPr>
-            <a:cxnSpLocks/>
-            <a:stCxn id="16" idx="3"/>
-            <a:endCxn id="19" idx="0"/>
-          </p:cNvCxnSpPr>
-          <p:nvPr/>
-        </p:nvCxnSpPr>
-        <p:spPr>
-          <a:xfrm flipH="1">
-            <a:off x="9071816" y="3667654"/>
-            <a:ext cx="20371" cy="528551"/>
-          </a:xfrm>
-          <a:prstGeom prst="line">
-            <a:avLst/>
-          </a:prstGeom>
-        </p:spPr>
-        <p:style>
-          <a:lnRef idx="1">
-            <a:schemeClr val="accent1"/>
-          </a:lnRef>
-          <a:fillRef idx="0">
-            <a:schemeClr val="accent1"/>
-          </a:fillRef>
-          <a:effectRef idx="0">
-            <a:schemeClr val="accent1"/>
-          </a:effectRef>
-          <a:fontRef idx="minor">
-            <a:schemeClr val="tx1"/>
-          </a:fontRef>
-        </p:style>
-      </p:cxnSp>
-    </p:spTree>
-    <p:extLst>
-      <p:ext uri="{BB962C8B-B14F-4D97-AF65-F5344CB8AC3E}">
-        <p14:creationId xmlns:p14="http://schemas.microsoft.com/office/powerpoint/2010/main" val="981623066"/>
-      </p:ext>
-    </p:extLst>
-  </p:cSld>
-  <p:clrMapOvr>
-    <a:masterClrMapping/>
-  </p:clrMapOvr>
-</p:sld>
-</file>
-
-<file path=ppt/slides/slide8.xml><?xml version="1.0" encoding="utf-8"?>
-<p:sld xmlns:a="http://schemas.openxmlformats.org/drawingml/2006/main" xmlns:r="http://schemas.openxmlformats.org/officeDocument/2006/relationships" xmlns:p="http://schemas.openxmlformats.org/presentationml/2006/main">
-  <p:cSld>
-    <p:spTree>
-      <p:nvGrpSpPr>
-        <p:cNvPr id="1" name=""/>
-        <p:cNvGrpSpPr/>
-        <p:nvPr/>
-      </p:nvGrpSpPr>
-      <p:grpSpPr>
-        <a:xfrm>
-          <a:off x="0" y="0"/>
-          <a:ext cx="0" cy="0"/>
-          <a:chOff x="0" y="0"/>
-          <a:chExt cx="0" cy="0"/>
-        </a:xfrm>
-      </p:grpSpPr>
-      <p:sp>
-        <p:nvSpPr>
-          <p:cNvPr id="2" name="Título 1">
-            <a:extLst>
-              <a:ext uri="{FF2B5EF4-FFF2-40B4-BE49-F238E27FC236}">
-                <a16:creationId xmlns:a16="http://schemas.microsoft.com/office/drawing/2014/main" id="{F69B6DDA-DCD0-4989-908B-1BFDDB8F8DFB}"/>
-              </a:ext>
-            </a:extLst>
-          </p:cNvPr>
-          <p:cNvSpPr>
-            <a:spLocks noGrp="1"/>
-          </p:cNvSpPr>
-          <p:nvPr>
-            <p:ph type="title"/>
-          </p:nvPr>
-        </p:nvSpPr>
-        <p:spPr/>
-        <p:txBody>
-          <a:bodyPr/>
-          <a:lstStyle/>
-          <a:p>
-            <a:r>
-              <a:rPr lang="pt-BR" dirty="0"/>
-              <a:t>Cenário: Trocar Produto</a:t>
-            </a:r>
-          </a:p>
-        </p:txBody>
-      </p:sp>
-      <p:sp>
-        <p:nvSpPr>
-          <p:cNvPr id="16" name="Cubo 15">
-            <a:extLst>
-              <a:ext uri="{FF2B5EF4-FFF2-40B4-BE49-F238E27FC236}">
-                <a16:creationId xmlns:a16="http://schemas.microsoft.com/office/drawing/2014/main" id="{98618C7C-3DA4-4764-9834-48BB32FA8E17}"/>
-              </a:ext>
-            </a:extLst>
-          </p:cNvPr>
-          <p:cNvSpPr/>
-          <p:nvPr/>
-        </p:nvSpPr>
-        <p:spPr bwMode="auto">
-          <a:xfrm>
-            <a:off x="8351520" y="3083198"/>
-            <a:ext cx="1627447" cy="584456"/>
-          </a:xfrm>
-          <a:prstGeom prst="cube">
-            <a:avLst/>
-          </a:prstGeom>
-          <a:solidFill>
-            <a:srgbClr val="FFC000"/>
-          </a:solidFill>
-          <a:ln>
-            <a:headEnd type="none" w="med" len="med"/>
-            <a:tailEnd type="none" w="med" len="med"/>
-          </a:ln>
-        </p:spPr>
-        <p:style>
-          <a:lnRef idx="2">
-            <a:schemeClr val="accent1"/>
-          </a:lnRef>
-          <a:fillRef idx="1">
-            <a:schemeClr val="lt1"/>
-          </a:fillRef>
-          <a:effectRef idx="0">
-            <a:schemeClr val="accent1"/>
-          </a:effectRef>
-          <a:fontRef idx="minor">
-            <a:schemeClr val="dk1"/>
-          </a:fontRef>
-        </p:style>
-        <p:txBody>
-          <a:bodyPr vert="horz" wrap="square" lIns="91440" tIns="45720" rIns="91440" bIns="45720" numCol="1" rtlCol="0" anchor="t" anchorCtr="0" compatLnSpc="1">
-            <a:prstTxWarp prst="textNoShape">
-              <a:avLst/>
-            </a:prstTxWarp>
-          </a:bodyPr>
-          <a:lstStyle/>
-          <a:p>
-            <a:pPr algn="ctr"/>
-            <a:r>
-              <a:rPr lang="pt-BR" sz="1000" dirty="0"/>
-              <a:t>Administrativo</a:t>
-            </a:r>
-          </a:p>
-          <a:p>
-            <a:pPr algn="ctr"/>
-            <a:r>
-              <a:rPr lang="pt-BR" sz="1000" b="1" dirty="0"/>
-              <a:t>(Nó Operacional)</a:t>
-            </a:r>
-          </a:p>
-          <a:p>
-            <a:pPr marL="0" marR="0" indent="0" algn="l" defTabSz="914400" rtl="0" eaLnBrk="1" fontAlgn="base" latinLnBrk="0" hangingPunct="1">
-              <a:lnSpc>
-                <a:spcPct val="100000"/>
-              </a:lnSpc>
-              <a:spcBef>
-                <a:spcPct val="0"/>
-              </a:spcBef>
-              <a:spcAft>
-                <a:spcPct val="0"/>
-              </a:spcAft>
-              <a:buClrTx/>
-              <a:buSzTx/>
-              <a:buFontTx/>
-              <a:buNone/>
-              <a:tabLst/>
-            </a:pPr>
-            <a:endParaRPr kumimoji="0" lang="pt-BR" sz="1000" b="0" i="0" u="none" strike="noStrike" cap="none" normalizeH="0" baseline="0" dirty="0">
-              <a:ln>
-                <a:noFill/>
-              </a:ln>
-              <a:solidFill>
-                <a:srgbClr val="000000"/>
-              </a:solidFill>
-              <a:effectLst/>
-              <a:latin typeface="Gill Sans" charset="0"/>
-              <a:ea typeface="ヒラギノ角ゴ ProN W3" charset="0"/>
-              <a:cs typeface="ヒラギノ角ゴ ProN W3" charset="0"/>
-              <a:sym typeface="Gill Sans" charset="0"/>
-            </a:endParaRPr>
-          </a:p>
-        </p:txBody>
-      </p:sp>
-      <p:sp>
-        <p:nvSpPr>
-          <p:cNvPr id="19" name="Retângulo de cantos arredondados 111">
-            <a:extLst>
-              <a:ext uri="{FF2B5EF4-FFF2-40B4-BE49-F238E27FC236}">
-                <a16:creationId xmlns:a16="http://schemas.microsoft.com/office/drawing/2014/main" id="{67FC9C97-6BBA-4BFC-A5E1-2436DE02BBE2}"/>
-              </a:ext>
-            </a:extLst>
-          </p:cNvPr>
-          <p:cNvSpPr/>
-          <p:nvPr/>
-        </p:nvSpPr>
-        <p:spPr>
-          <a:xfrm>
-            <a:off x="8310172" y="4196205"/>
-            <a:ext cx="1523287" cy="538383"/>
-          </a:xfrm>
-          <a:prstGeom prst="roundRect">
-            <a:avLst/>
-          </a:prstGeom>
-          <a:scene3d>
-            <a:camera prst="orthographicFront">
-              <a:rot lat="0" lon="0" rev="0"/>
-            </a:camera>
-            <a:lightRig rig="contrasting" dir="t">
-              <a:rot lat="0" lon="0" rev="1200000"/>
-            </a:lightRig>
-          </a:scene3d>
-          <a:sp3d contourW="19050" prstMaterial="metal">
-            <a:bevelT w="88900" h="203200"/>
-            <a:bevelB w="165100" h="254000"/>
-          </a:sp3d>
-        </p:spPr>
-        <p:style>
-          <a:lnRef idx="0">
-            <a:schemeClr val="lt1">
-              <a:hueOff val="0"/>
-              <a:satOff val="0"/>
-              <a:lumOff val="0"/>
-              <a:alphaOff val="0"/>
-            </a:schemeClr>
-          </a:lnRef>
-          <a:fillRef idx="1">
-            <a:schemeClr val="accent6">
-              <a:hueOff val="0"/>
-              <a:satOff val="0"/>
-              <a:lumOff val="0"/>
-              <a:alphaOff val="0"/>
-            </a:schemeClr>
-          </a:fillRef>
-          <a:effectRef idx="1">
-            <a:schemeClr val="accent6">
-              <a:hueOff val="0"/>
-              <a:satOff val="0"/>
-              <a:lumOff val="0"/>
-              <a:alphaOff val="0"/>
-            </a:schemeClr>
-          </a:effectRef>
-          <a:fontRef idx="minor">
-            <a:schemeClr val="lt1"/>
-          </a:fontRef>
-        </p:style>
-        <p:txBody>
-          <a:bodyPr rtlCol="0" anchor="ctr"/>
-          <a:lstStyle/>
-          <a:p>
-            <a:pPr algn="ctr"/>
-            <a:r>
-              <a:rPr lang="pt-BR" sz="1200" b="1" dirty="0"/>
-              <a:t>Tratar solicitação de troca de produto</a:t>
-            </a:r>
-            <a:endParaRPr lang="pt-BR" sz="1200" dirty="0"/>
-          </a:p>
-        </p:txBody>
-      </p:sp>
-      <p:sp>
-        <p:nvSpPr>
-          <p:cNvPr id="23" name="Retângulo 22">
-            <a:extLst>
-              <a:ext uri="{FF2B5EF4-FFF2-40B4-BE49-F238E27FC236}">
-                <a16:creationId xmlns:a16="http://schemas.microsoft.com/office/drawing/2014/main" id="{60488A81-F715-4F1B-B2A8-84FD4A5E863D}"/>
-              </a:ext>
-            </a:extLst>
-          </p:cNvPr>
-          <p:cNvSpPr/>
-          <p:nvPr/>
-        </p:nvSpPr>
-        <p:spPr>
-          <a:xfrm>
-            <a:off x="8485877" y="365125"/>
-            <a:ext cx="1336431" cy="914400"/>
-          </a:xfrm>
-          <a:prstGeom prst="rect">
-            <a:avLst/>
-          </a:prstGeom>
-        </p:spPr>
-        <p:style>
-          <a:lnRef idx="2">
-            <a:schemeClr val="accent1">
-              <a:shade val="50000"/>
-            </a:schemeClr>
-          </a:lnRef>
-          <a:fillRef idx="1">
-            <a:schemeClr val="accent1"/>
-          </a:fillRef>
-          <a:effectRef idx="0">
-            <a:schemeClr val="accent1"/>
-          </a:effectRef>
-          <a:fontRef idx="minor">
-            <a:schemeClr val="lt1"/>
-          </a:fontRef>
-        </p:style>
-        <p:txBody>
-          <a:bodyPr rtlCol="0" anchor="ctr"/>
-          <a:lstStyle/>
-          <a:p>
-            <a:pPr algn="ctr"/>
-            <a:r>
-              <a:rPr lang="pt-BR" dirty="0"/>
-              <a:t>Fornecedor</a:t>
-            </a:r>
-          </a:p>
-        </p:txBody>
-      </p:sp>
-      <p:cxnSp>
-        <p:nvCxnSpPr>
-          <p:cNvPr id="24" name="Conector: Curvo 23">
-            <a:extLst>
-              <a:ext uri="{FF2B5EF4-FFF2-40B4-BE49-F238E27FC236}">
-                <a16:creationId xmlns:a16="http://schemas.microsoft.com/office/drawing/2014/main" id="{44A9E956-499F-4429-8233-C6931F55333B}"/>
-              </a:ext>
-            </a:extLst>
-          </p:cNvPr>
-          <p:cNvCxnSpPr>
-            <a:cxnSpLocks/>
-            <a:stCxn id="23" idx="2"/>
-            <a:endCxn id="26" idx="0"/>
-          </p:cNvCxnSpPr>
-          <p:nvPr/>
-        </p:nvCxnSpPr>
-        <p:spPr>
-          <a:xfrm rot="16200000" flipH="1">
-            <a:off x="8605696" y="1827921"/>
-            <a:ext cx="1107944" cy="11151"/>
-          </a:xfrm>
-          <a:prstGeom prst="curvedConnector3">
-            <a:avLst>
-              <a:gd name="adj1" fmla="val 50000"/>
-            </a:avLst>
-          </a:prstGeom>
-        </p:spPr>
-        <p:style>
-          <a:lnRef idx="1">
-            <a:schemeClr val="accent1"/>
-          </a:lnRef>
-          <a:fillRef idx="0">
-            <a:schemeClr val="accent1"/>
-          </a:fillRef>
-          <a:effectRef idx="0">
-            <a:schemeClr val="accent1"/>
-          </a:effectRef>
-          <a:fontRef idx="minor">
-            <a:schemeClr val="tx1"/>
-          </a:fontRef>
-        </p:style>
-      </p:cxnSp>
-      <p:sp>
-        <p:nvSpPr>
-          <p:cNvPr id="26" name="Retângulo: Cantos Arredondados 25">
-            <a:extLst>
-              <a:ext uri="{FF2B5EF4-FFF2-40B4-BE49-F238E27FC236}">
-                <a16:creationId xmlns:a16="http://schemas.microsoft.com/office/drawing/2014/main" id="{0CC10807-6876-4F24-9E71-B543D1F8799A}"/>
-              </a:ext>
-            </a:extLst>
-          </p:cNvPr>
-          <p:cNvSpPr/>
-          <p:nvPr/>
-        </p:nvSpPr>
-        <p:spPr>
-          <a:xfrm>
-            <a:off x="7359890" y="2387469"/>
-            <a:ext cx="3610708" cy="2875670"/>
-          </a:xfrm>
-          <a:prstGeom prst="roundRect">
-            <a:avLst/>
-          </a:prstGeom>
-          <a:noFill/>
-        </p:spPr>
-        <p:style>
-          <a:lnRef idx="2">
-            <a:schemeClr val="accent1">
-              <a:shade val="50000"/>
-            </a:schemeClr>
-          </a:lnRef>
-          <a:fillRef idx="1">
-            <a:schemeClr val="accent1"/>
-          </a:fillRef>
-          <a:effectRef idx="0">
-            <a:schemeClr val="accent1"/>
-          </a:effectRef>
-          <a:fontRef idx="minor">
-            <a:schemeClr val="lt1"/>
-          </a:fontRef>
-        </p:style>
-        <p:txBody>
-          <a:bodyPr rtlCol="0" anchor="t" anchorCtr="0"/>
-          <a:lstStyle/>
-          <a:p>
-            <a:pPr algn="ctr"/>
-            <a:r>
-              <a:rPr lang="pt-BR" dirty="0">
-                <a:solidFill>
-                  <a:schemeClr val="tx1"/>
-                </a:solidFill>
-              </a:rPr>
-              <a:t>Smart Glass</a:t>
-            </a:r>
-          </a:p>
-        </p:txBody>
-      </p:sp>
-      <p:sp>
-        <p:nvSpPr>
-          <p:cNvPr id="30" name="Texto Explicativo: Linha com Borda e Ênfase 29">
-            <a:extLst>
-              <a:ext uri="{FF2B5EF4-FFF2-40B4-BE49-F238E27FC236}">
-                <a16:creationId xmlns:a16="http://schemas.microsoft.com/office/drawing/2014/main" id="{1D920C9D-0880-4BB2-91D0-FA1A972BB24C}"/>
-              </a:ext>
-            </a:extLst>
-          </p:cNvPr>
-          <p:cNvSpPr/>
-          <p:nvPr/>
-        </p:nvSpPr>
-        <p:spPr>
-          <a:xfrm>
-            <a:off x="2304127" y="1833496"/>
-            <a:ext cx="3896751" cy="972044"/>
-          </a:xfrm>
-          <a:prstGeom prst="accentBorderCallout1">
-            <a:avLst>
-              <a:gd name="adj1" fmla="val 39011"/>
-              <a:gd name="adj2" fmla="val 102497"/>
-              <a:gd name="adj3" fmla="val 163153"/>
-              <a:gd name="adj4" fmla="val 157034"/>
-            </a:avLst>
-          </a:prstGeom>
-          <a:solidFill>
-            <a:srgbClr val="FFFFCC"/>
-          </a:solidFill>
-        </p:spPr>
-        <p:style>
-          <a:lnRef idx="1">
-            <a:schemeClr val="accent4"/>
-          </a:lnRef>
-          <a:fillRef idx="2">
-            <a:schemeClr val="accent4"/>
-          </a:fillRef>
-          <a:effectRef idx="1">
-            <a:schemeClr val="accent4"/>
-          </a:effectRef>
-          <a:fontRef idx="minor">
-            <a:schemeClr val="dk1"/>
-          </a:fontRef>
-        </p:style>
-        <p:txBody>
-          <a:bodyPr rtlCol="0" anchor="ctr"/>
-          <a:lstStyle/>
-          <a:p>
-            <a:pPr algn="ctr"/>
-            <a:r>
-              <a:rPr lang="pt-BR" dirty="0"/>
-              <a:t>Neste cenário, o Fornecedor interage com o Administrativo (Nó Operacional)</a:t>
-            </a:r>
-          </a:p>
-        </p:txBody>
-      </p:sp>
-      <p:sp>
-        <p:nvSpPr>
-          <p:cNvPr id="32" name="Texto Explicativo: Linha com Borda e Ênfase 31">
-            <a:extLst>
-              <a:ext uri="{FF2B5EF4-FFF2-40B4-BE49-F238E27FC236}">
-                <a16:creationId xmlns:a16="http://schemas.microsoft.com/office/drawing/2014/main" id="{CFB097E5-A0A7-4453-AECF-AE3EC341F437}"/>
-              </a:ext>
-            </a:extLst>
-          </p:cNvPr>
-          <p:cNvSpPr/>
-          <p:nvPr/>
-        </p:nvSpPr>
-        <p:spPr>
-          <a:xfrm>
-            <a:off x="2698596" y="5520831"/>
-            <a:ext cx="4516646" cy="972044"/>
-          </a:xfrm>
-          <a:prstGeom prst="accentBorderCallout1">
-            <a:avLst>
-              <a:gd name="adj1" fmla="val 28880"/>
-              <a:gd name="adj2" fmla="val 102497"/>
-              <a:gd name="adj3" fmla="val -87217"/>
-              <a:gd name="adj4" fmla="val 128515"/>
-            </a:avLst>
-          </a:prstGeom>
-          <a:solidFill>
-            <a:srgbClr val="FFFFCC"/>
-          </a:solidFill>
-        </p:spPr>
-        <p:style>
-          <a:lnRef idx="1">
-            <a:schemeClr val="accent4"/>
-          </a:lnRef>
-          <a:fillRef idx="2">
-            <a:schemeClr val="accent4"/>
-          </a:fillRef>
-          <a:effectRef idx="1">
-            <a:schemeClr val="accent4"/>
-          </a:effectRef>
-          <a:fontRef idx="minor">
-            <a:schemeClr val="dk1"/>
-          </a:fontRef>
-        </p:style>
-        <p:txBody>
-          <a:bodyPr rtlCol="0" anchor="ctr"/>
-          <a:lstStyle/>
-          <a:p>
-            <a:pPr algn="ctr"/>
-            <a:r>
-              <a:rPr lang="pt-BR" dirty="0"/>
-              <a:t>O Administrativo (Nó Operacional) necessita, neste cenário, da capacidade de </a:t>
-            </a:r>
-          </a:p>
-          <a:p>
-            <a:pPr algn="ctr"/>
-            <a:r>
-              <a:rPr lang="pt-BR" dirty="0"/>
-              <a:t>“Tratar solicitação de troca de produto”</a:t>
-            </a:r>
-          </a:p>
-        </p:txBody>
-      </p:sp>
-      <p:cxnSp>
-        <p:nvCxnSpPr>
-          <p:cNvPr id="34" name="Conector reto 33">
-            <a:extLst>
-              <a:ext uri="{FF2B5EF4-FFF2-40B4-BE49-F238E27FC236}">
-                <a16:creationId xmlns:a16="http://schemas.microsoft.com/office/drawing/2014/main" id="{59DADD7E-FDEE-4062-8BCD-3A38A85A4179}"/>
-              </a:ext>
-            </a:extLst>
-          </p:cNvPr>
-          <p:cNvCxnSpPr>
-            <a:cxnSpLocks/>
-            <a:stCxn id="16" idx="3"/>
-            <a:endCxn id="19" idx="0"/>
-          </p:cNvCxnSpPr>
-          <p:nvPr/>
-        </p:nvCxnSpPr>
-        <p:spPr>
-          <a:xfrm flipH="1">
-            <a:off x="9071816" y="3667654"/>
-            <a:ext cx="20371" cy="528551"/>
-          </a:xfrm>
-          <a:prstGeom prst="line">
-            <a:avLst/>
-          </a:prstGeom>
-        </p:spPr>
-        <p:style>
-          <a:lnRef idx="1">
-            <a:schemeClr val="accent1"/>
-          </a:lnRef>
-          <a:fillRef idx="0">
-            <a:schemeClr val="accent1"/>
-          </a:fillRef>
-          <a:effectRef idx="0">
-            <a:schemeClr val="accent1"/>
-          </a:effectRef>
-          <a:fontRef idx="minor">
-            <a:schemeClr val="tx1"/>
-          </a:fontRef>
-        </p:style>
-      </p:cxnSp>
-    </p:spTree>
-    <p:extLst>
-      <p:ext uri="{BB962C8B-B14F-4D97-AF65-F5344CB8AC3E}">
-        <p14:creationId xmlns:p14="http://schemas.microsoft.com/office/powerpoint/2010/main" val="3630631807"/>
-      </p:ext>
-    </p:extLst>
-  </p:cSld>
-  <p:clrMapOvr>
-    <a:masterClrMapping/>
-  </p:clrMapOvr>
-</p:sld>
-</file>
-
-<file path=ppt/slides/slide9.xml><?xml version="1.0" encoding="utf-8"?>
-<p:sld xmlns:a="http://schemas.openxmlformats.org/drawingml/2006/main" xmlns:r="http://schemas.openxmlformats.org/officeDocument/2006/relationships" xmlns:p="http://schemas.openxmlformats.org/presentationml/2006/main">
-  <p:cSld>
-    <p:spTree>
-      <p:nvGrpSpPr>
-        <p:cNvPr id="1" name=""/>
-        <p:cNvGrpSpPr/>
-        <p:nvPr/>
-      </p:nvGrpSpPr>
-      <p:grpSpPr>
-        <a:xfrm>
-          <a:off x="0" y="0"/>
-          <a:ext cx="0" cy="0"/>
-          <a:chOff x="0" y="0"/>
-          <a:chExt cx="0" cy="0"/>
-        </a:xfrm>
-      </p:grpSpPr>
-      <p:sp>
-        <p:nvSpPr>
-          <p:cNvPr id="2" name="Título 1">
-            <a:extLst>
-              <a:ext uri="{FF2B5EF4-FFF2-40B4-BE49-F238E27FC236}">
-                <a16:creationId xmlns:a16="http://schemas.microsoft.com/office/drawing/2014/main" id="{F69B6DDA-DCD0-4989-908B-1BFDDB8F8DFB}"/>
-              </a:ext>
-            </a:extLst>
-          </p:cNvPr>
-          <p:cNvSpPr>
-            <a:spLocks noGrp="1"/>
-          </p:cNvSpPr>
-          <p:nvPr>
-            <p:ph type="title"/>
-          </p:nvPr>
-        </p:nvSpPr>
-        <p:spPr/>
-        <p:txBody>
-          <a:bodyPr/>
-          <a:lstStyle/>
-          <a:p>
-            <a:r>
-              <a:rPr lang="pt-BR" dirty="0"/>
-              <a:t>Cenário: Desfazer Venda</a:t>
-            </a:r>
-          </a:p>
-        </p:txBody>
-      </p:sp>
-      <p:sp>
-        <p:nvSpPr>
-          <p:cNvPr id="16" name="Cubo 15">
-            <a:extLst>
-              <a:ext uri="{FF2B5EF4-FFF2-40B4-BE49-F238E27FC236}">
-                <a16:creationId xmlns:a16="http://schemas.microsoft.com/office/drawing/2014/main" id="{98618C7C-3DA4-4764-9834-48BB32FA8E17}"/>
-              </a:ext>
-            </a:extLst>
-          </p:cNvPr>
-          <p:cNvSpPr/>
-          <p:nvPr/>
-        </p:nvSpPr>
-        <p:spPr bwMode="auto">
-          <a:xfrm>
-            <a:off x="8351520" y="3083198"/>
-            <a:ext cx="1627447" cy="584456"/>
-          </a:xfrm>
-          <a:prstGeom prst="cube">
-            <a:avLst/>
-          </a:prstGeom>
-          <a:solidFill>
-            <a:srgbClr val="FFC000"/>
-          </a:solidFill>
-          <a:ln>
-            <a:headEnd type="none" w="med" len="med"/>
-            <a:tailEnd type="none" w="med" len="med"/>
-          </a:ln>
-        </p:spPr>
-        <p:style>
-          <a:lnRef idx="2">
-            <a:schemeClr val="accent1"/>
-          </a:lnRef>
-          <a:fillRef idx="1">
-            <a:schemeClr val="lt1"/>
-          </a:fillRef>
-          <a:effectRef idx="0">
-            <a:schemeClr val="accent1"/>
-          </a:effectRef>
-          <a:fontRef idx="minor">
-            <a:schemeClr val="dk1"/>
-          </a:fontRef>
-        </p:style>
-        <p:txBody>
-          <a:bodyPr vert="horz" wrap="square" lIns="91440" tIns="45720" rIns="91440" bIns="45720" numCol="1" rtlCol="0" anchor="t" anchorCtr="0" compatLnSpc="1">
-            <a:prstTxWarp prst="textNoShape">
-              <a:avLst/>
-            </a:prstTxWarp>
-          </a:bodyPr>
-          <a:lstStyle/>
-          <a:p>
-            <a:pPr algn="ctr"/>
-            <a:r>
-              <a:rPr lang="pt-BR" sz="1000" dirty="0"/>
-              <a:t>Administrativo</a:t>
-            </a:r>
-          </a:p>
-          <a:p>
-            <a:pPr algn="ctr"/>
-            <a:r>
-              <a:rPr lang="pt-BR" sz="1000" b="1" dirty="0"/>
-              <a:t>(Nó Operacional)</a:t>
-            </a:r>
-          </a:p>
-          <a:p>
-            <a:pPr marL="0" marR="0" indent="0" algn="l" defTabSz="914400" rtl="0" eaLnBrk="1" fontAlgn="base" latinLnBrk="0" hangingPunct="1">
-              <a:lnSpc>
-                <a:spcPct val="100000"/>
-              </a:lnSpc>
-              <a:spcBef>
-                <a:spcPct val="0"/>
-              </a:spcBef>
-              <a:spcAft>
-                <a:spcPct val="0"/>
-              </a:spcAft>
-              <a:buClrTx/>
-              <a:buSzTx/>
-              <a:buFontTx/>
-              <a:buNone/>
-              <a:tabLst/>
-            </a:pPr>
-            <a:endParaRPr kumimoji="0" lang="pt-BR" sz="1000" b="0" i="0" u="none" strike="noStrike" cap="none" normalizeH="0" baseline="0" dirty="0">
-              <a:ln>
-                <a:noFill/>
-              </a:ln>
-              <a:solidFill>
-                <a:srgbClr val="000000"/>
-              </a:solidFill>
-              <a:effectLst/>
-              <a:latin typeface="Gill Sans" charset="0"/>
-              <a:ea typeface="ヒラギノ角ゴ ProN W3" charset="0"/>
-              <a:cs typeface="ヒラギノ角ゴ ProN W3" charset="0"/>
-              <a:sym typeface="Gill Sans" charset="0"/>
-            </a:endParaRPr>
-          </a:p>
-        </p:txBody>
-      </p:sp>
-      <p:sp>
-        <p:nvSpPr>
-          <p:cNvPr id="19" name="Retângulo de cantos arredondados 111">
-            <a:extLst>
-              <a:ext uri="{FF2B5EF4-FFF2-40B4-BE49-F238E27FC236}">
-                <a16:creationId xmlns:a16="http://schemas.microsoft.com/office/drawing/2014/main" id="{67FC9C97-6BBA-4BFC-A5E1-2436DE02BBE2}"/>
-              </a:ext>
-            </a:extLst>
-          </p:cNvPr>
-          <p:cNvSpPr/>
-          <p:nvPr/>
-        </p:nvSpPr>
-        <p:spPr>
-          <a:xfrm>
-            <a:off x="8272918" y="4196205"/>
-            <a:ext cx="1627447" cy="538383"/>
-          </a:xfrm>
-          <a:prstGeom prst="roundRect">
-            <a:avLst/>
-          </a:prstGeom>
-          <a:scene3d>
-            <a:camera prst="orthographicFront">
-              <a:rot lat="0" lon="0" rev="0"/>
-            </a:camera>
-            <a:lightRig rig="contrasting" dir="t">
-              <a:rot lat="0" lon="0" rev="1200000"/>
-            </a:lightRig>
-          </a:scene3d>
-          <a:sp3d contourW="19050" prstMaterial="metal">
-            <a:bevelT w="88900" h="203200"/>
-            <a:bevelB w="165100" h="254000"/>
-          </a:sp3d>
-        </p:spPr>
-        <p:style>
-          <a:lnRef idx="0">
-            <a:schemeClr val="lt1">
-              <a:hueOff val="0"/>
-              <a:satOff val="0"/>
-              <a:lumOff val="0"/>
-              <a:alphaOff val="0"/>
-            </a:schemeClr>
-          </a:lnRef>
-          <a:fillRef idx="1">
-            <a:schemeClr val="accent6">
-              <a:hueOff val="0"/>
-              <a:satOff val="0"/>
-              <a:lumOff val="0"/>
-              <a:alphaOff val="0"/>
-            </a:schemeClr>
-          </a:fillRef>
-          <a:effectRef idx="1">
-            <a:schemeClr val="accent6">
-              <a:hueOff val="0"/>
-              <a:satOff val="0"/>
-              <a:lumOff val="0"/>
-              <a:alphaOff val="0"/>
-            </a:schemeClr>
-          </a:effectRef>
-          <a:fontRef idx="minor">
-            <a:schemeClr val="lt1"/>
-          </a:fontRef>
-        </p:style>
-        <p:txBody>
-          <a:bodyPr rtlCol="0" anchor="ctr"/>
-          <a:lstStyle/>
-          <a:p>
-            <a:pPr algn="ctr"/>
-            <a:r>
-              <a:rPr lang="pt-BR" sz="1200" b="1" dirty="0"/>
-              <a:t>Tratar cancelamento da compra</a:t>
-            </a:r>
-            <a:endParaRPr lang="pt-BR" sz="1200" dirty="0"/>
-          </a:p>
-        </p:txBody>
-      </p:sp>
-      <p:sp>
-        <p:nvSpPr>
-          <p:cNvPr id="23" name="Retângulo 22">
-            <a:extLst>
-              <a:ext uri="{FF2B5EF4-FFF2-40B4-BE49-F238E27FC236}">
-                <a16:creationId xmlns:a16="http://schemas.microsoft.com/office/drawing/2014/main" id="{60488A81-F715-4F1B-B2A8-84FD4A5E863D}"/>
-              </a:ext>
-            </a:extLst>
-          </p:cNvPr>
-          <p:cNvSpPr/>
-          <p:nvPr/>
-        </p:nvSpPr>
-        <p:spPr>
-          <a:xfrm>
-            <a:off x="8485877" y="365125"/>
-            <a:ext cx="1336431" cy="914400"/>
-          </a:xfrm>
-          <a:prstGeom prst="rect">
-            <a:avLst/>
-          </a:prstGeom>
-        </p:spPr>
-        <p:style>
-          <a:lnRef idx="2">
-            <a:schemeClr val="accent1">
-              <a:shade val="50000"/>
-            </a:schemeClr>
-          </a:lnRef>
-          <a:fillRef idx="1">
-            <a:schemeClr val="accent1"/>
-          </a:fillRef>
-          <a:effectRef idx="0">
-            <a:schemeClr val="accent1"/>
-          </a:effectRef>
-          <a:fontRef idx="minor">
-            <a:schemeClr val="lt1"/>
-          </a:fontRef>
-        </p:style>
-        <p:txBody>
-          <a:bodyPr rtlCol="0" anchor="ctr"/>
-          <a:lstStyle/>
-          <a:p>
-            <a:pPr algn="ctr"/>
-            <a:r>
-              <a:rPr lang="pt-BR" dirty="0"/>
-              <a:t>Fornecedor</a:t>
-            </a:r>
-          </a:p>
-        </p:txBody>
-      </p:sp>
-      <p:cxnSp>
-        <p:nvCxnSpPr>
-          <p:cNvPr id="24" name="Conector: Curvo 23">
-            <a:extLst>
-              <a:ext uri="{FF2B5EF4-FFF2-40B4-BE49-F238E27FC236}">
-                <a16:creationId xmlns:a16="http://schemas.microsoft.com/office/drawing/2014/main" id="{44A9E956-499F-4429-8233-C6931F55333B}"/>
-              </a:ext>
-            </a:extLst>
-          </p:cNvPr>
-          <p:cNvCxnSpPr>
-            <a:cxnSpLocks/>
-            <a:stCxn id="23" idx="2"/>
-            <a:endCxn id="26" idx="0"/>
-          </p:cNvCxnSpPr>
-          <p:nvPr/>
-        </p:nvCxnSpPr>
-        <p:spPr>
-          <a:xfrm rot="16200000" flipH="1">
-            <a:off x="8605696" y="1827921"/>
-            <a:ext cx="1107944" cy="11151"/>
-          </a:xfrm>
-          <a:prstGeom prst="curvedConnector3">
-            <a:avLst>
-              <a:gd name="adj1" fmla="val 50000"/>
-            </a:avLst>
-          </a:prstGeom>
-        </p:spPr>
-        <p:style>
-          <a:lnRef idx="1">
-            <a:schemeClr val="accent1"/>
-          </a:lnRef>
-          <a:fillRef idx="0">
-            <a:schemeClr val="accent1"/>
-          </a:fillRef>
-          <a:effectRef idx="0">
-            <a:schemeClr val="accent1"/>
-          </a:effectRef>
-          <a:fontRef idx="minor">
-            <a:schemeClr val="tx1"/>
-          </a:fontRef>
-        </p:style>
-      </p:cxnSp>
-      <p:sp>
-        <p:nvSpPr>
-          <p:cNvPr id="26" name="Retângulo: Cantos Arredondados 25">
-            <a:extLst>
-              <a:ext uri="{FF2B5EF4-FFF2-40B4-BE49-F238E27FC236}">
-                <a16:creationId xmlns:a16="http://schemas.microsoft.com/office/drawing/2014/main" id="{0CC10807-6876-4F24-9E71-B543D1F8799A}"/>
-              </a:ext>
-            </a:extLst>
-          </p:cNvPr>
-          <p:cNvSpPr/>
-          <p:nvPr/>
-        </p:nvSpPr>
-        <p:spPr>
-          <a:xfrm>
-            <a:off x="7359890" y="2387469"/>
-            <a:ext cx="3610708" cy="2875670"/>
-          </a:xfrm>
-          <a:prstGeom prst="roundRect">
-            <a:avLst/>
-          </a:prstGeom>
-          <a:noFill/>
-        </p:spPr>
-        <p:style>
-          <a:lnRef idx="2">
-            <a:schemeClr val="accent1">
-              <a:shade val="50000"/>
-            </a:schemeClr>
-          </a:lnRef>
-          <a:fillRef idx="1">
-            <a:schemeClr val="accent1"/>
-          </a:fillRef>
-          <a:effectRef idx="0">
-            <a:schemeClr val="accent1"/>
-          </a:effectRef>
-          <a:fontRef idx="minor">
-            <a:schemeClr val="lt1"/>
-          </a:fontRef>
-        </p:style>
-        <p:txBody>
-          <a:bodyPr rtlCol="0" anchor="t" anchorCtr="0"/>
-          <a:lstStyle/>
-          <a:p>
-            <a:pPr algn="ctr"/>
-            <a:r>
-              <a:rPr lang="pt-BR" dirty="0">
-                <a:solidFill>
-                  <a:schemeClr val="tx1"/>
-                </a:solidFill>
-              </a:rPr>
-              <a:t>Smart Glass</a:t>
-            </a:r>
-          </a:p>
-        </p:txBody>
-      </p:sp>
-      <p:sp>
-        <p:nvSpPr>
-          <p:cNvPr id="30" name="Texto Explicativo: Linha com Borda e Ênfase 29">
-            <a:extLst>
-              <a:ext uri="{FF2B5EF4-FFF2-40B4-BE49-F238E27FC236}">
-                <a16:creationId xmlns:a16="http://schemas.microsoft.com/office/drawing/2014/main" id="{1D920C9D-0880-4BB2-91D0-FA1A972BB24C}"/>
-              </a:ext>
-            </a:extLst>
-          </p:cNvPr>
-          <p:cNvSpPr/>
-          <p:nvPr/>
-        </p:nvSpPr>
-        <p:spPr>
-          <a:xfrm>
-            <a:off x="2304127" y="1833496"/>
-            <a:ext cx="3896751" cy="972044"/>
-          </a:xfrm>
-          <a:prstGeom prst="accentBorderCallout1">
-            <a:avLst>
-              <a:gd name="adj1" fmla="val 39011"/>
-              <a:gd name="adj2" fmla="val 102497"/>
-              <a:gd name="adj3" fmla="val 163153"/>
-              <a:gd name="adj4" fmla="val 157034"/>
-            </a:avLst>
-          </a:prstGeom>
-          <a:solidFill>
-            <a:srgbClr val="FFFFCC"/>
-          </a:solidFill>
-        </p:spPr>
-        <p:style>
-          <a:lnRef idx="1">
-            <a:schemeClr val="accent4"/>
-          </a:lnRef>
-          <a:fillRef idx="2">
-            <a:schemeClr val="accent4"/>
-          </a:fillRef>
-          <a:effectRef idx="1">
-            <a:schemeClr val="accent4"/>
-          </a:effectRef>
-          <a:fontRef idx="minor">
-            <a:schemeClr val="dk1"/>
-          </a:fontRef>
-        </p:style>
-        <p:txBody>
-          <a:bodyPr rtlCol="0" anchor="ctr"/>
-          <a:lstStyle/>
-          <a:p>
-            <a:pPr algn="ctr"/>
-            <a:r>
-              <a:rPr lang="pt-BR" dirty="0"/>
-              <a:t>Neste cenário, o Fornecedor interage com o Administrativo (Nó Operacional)</a:t>
-            </a:r>
-          </a:p>
-        </p:txBody>
-      </p:sp>
-      <p:sp>
-        <p:nvSpPr>
-          <p:cNvPr id="32" name="Texto Explicativo: Linha com Borda e Ênfase 31">
-            <a:extLst>
-              <a:ext uri="{FF2B5EF4-FFF2-40B4-BE49-F238E27FC236}">
-                <a16:creationId xmlns:a16="http://schemas.microsoft.com/office/drawing/2014/main" id="{CFB097E5-A0A7-4453-AECF-AE3EC341F437}"/>
-              </a:ext>
-            </a:extLst>
-          </p:cNvPr>
-          <p:cNvSpPr/>
-          <p:nvPr/>
-        </p:nvSpPr>
-        <p:spPr>
-          <a:xfrm>
-            <a:off x="2910468" y="5520831"/>
-            <a:ext cx="4304773" cy="972044"/>
-          </a:xfrm>
-          <a:prstGeom prst="accentBorderCallout1">
-            <a:avLst>
-              <a:gd name="adj1" fmla="val 28880"/>
-              <a:gd name="adj2" fmla="val 102497"/>
-              <a:gd name="adj3" fmla="val -87217"/>
-              <a:gd name="adj4" fmla="val 128515"/>
-            </a:avLst>
-          </a:prstGeom>
-          <a:solidFill>
-            <a:srgbClr val="FFFFCC"/>
-          </a:solidFill>
-        </p:spPr>
-        <p:style>
-          <a:lnRef idx="1">
-            <a:schemeClr val="accent4"/>
-          </a:lnRef>
-          <a:fillRef idx="2">
-            <a:schemeClr val="accent4"/>
-          </a:fillRef>
-          <a:effectRef idx="1">
-            <a:schemeClr val="accent4"/>
-          </a:effectRef>
-          <a:fontRef idx="minor">
-            <a:schemeClr val="dk1"/>
-          </a:fontRef>
-        </p:style>
-        <p:txBody>
-          <a:bodyPr rtlCol="0" anchor="ctr"/>
-          <a:lstStyle/>
-          <a:p>
-            <a:pPr algn="ctr"/>
-            <a:r>
-              <a:rPr lang="pt-BR" dirty="0"/>
-              <a:t>O Administrativo (Nó Operacional) necessita, neste cenário, da capacidade de </a:t>
-            </a:r>
-          </a:p>
-          <a:p>
-            <a:pPr algn="ctr"/>
-            <a:r>
-              <a:rPr lang="pt-BR" dirty="0"/>
-              <a:t>“Tratar cancelamento da compra”</a:t>
-            </a:r>
-          </a:p>
-        </p:txBody>
-      </p:sp>
-      <p:cxnSp>
-        <p:nvCxnSpPr>
-          <p:cNvPr id="34" name="Conector reto 33">
-            <a:extLst>
-              <a:ext uri="{FF2B5EF4-FFF2-40B4-BE49-F238E27FC236}">
-                <a16:creationId xmlns:a16="http://schemas.microsoft.com/office/drawing/2014/main" id="{59DADD7E-FDEE-4062-8BCD-3A38A85A4179}"/>
-              </a:ext>
-            </a:extLst>
-          </p:cNvPr>
-          <p:cNvCxnSpPr>
-            <a:cxnSpLocks/>
-            <a:stCxn id="16" idx="3"/>
-            <a:endCxn id="19" idx="0"/>
-          </p:cNvCxnSpPr>
-          <p:nvPr/>
-        </p:nvCxnSpPr>
-        <p:spPr>
-          <a:xfrm flipH="1">
-            <a:off x="9086642" y="3667654"/>
-            <a:ext cx="5545" cy="528551"/>
-          </a:xfrm>
-          <a:prstGeom prst="line">
-            <a:avLst/>
-          </a:prstGeom>
-        </p:spPr>
-        <p:style>
-          <a:lnRef idx="1">
-            <a:schemeClr val="accent1"/>
-          </a:lnRef>
-          <a:fillRef idx="0">
-            <a:schemeClr val="accent1"/>
-          </a:fillRef>
-          <a:effectRef idx="0">
-            <a:schemeClr val="accent1"/>
-          </a:effectRef>
-          <a:fontRef idx="minor">
-            <a:schemeClr val="tx1"/>
-          </a:fontRef>
-        </p:style>
-      </p:cxnSp>
-    </p:spTree>
-    <p:extLst>
-      <p:ext uri="{BB962C8B-B14F-4D97-AF65-F5344CB8AC3E}">
-        <p14:creationId xmlns:p14="http://schemas.microsoft.com/office/powerpoint/2010/main" val="1955034357"/>
       </p:ext>
     </p:extLst>
   </p:cSld>

</xml_diff>